<commit_message>
- omówienie wykorzystania komend
</commit_message>
<xml_diff>
--- a/gitLab - tutorial.pptx
+++ b/gitLab - tutorial.pptx
@@ -5,7 +5,7 @@
     <p:sldMasterId id="2147483648" r:id="rId1"/>
   </p:sldMasterIdLst>
   <p:notesMasterIdLst>
-    <p:notesMasterId r:id="rId26"/>
+    <p:notesMasterId r:id="rId33"/>
   </p:notesMasterIdLst>
   <p:sldIdLst>
     <p:sldId id="256" r:id="rId2"/>
@@ -16,22 +16,29 @@
     <p:sldId id="278" r:id="rId7"/>
     <p:sldId id="280" r:id="rId8"/>
     <p:sldId id="282" r:id="rId9"/>
-    <p:sldId id="283" r:id="rId10"/>
-    <p:sldId id="273" r:id="rId11"/>
-    <p:sldId id="269" r:id="rId12"/>
-    <p:sldId id="262" r:id="rId13"/>
-    <p:sldId id="261" r:id="rId14"/>
-    <p:sldId id="263" r:id="rId15"/>
-    <p:sldId id="264" r:id="rId16"/>
-    <p:sldId id="265" r:id="rId17"/>
-    <p:sldId id="266" r:id="rId18"/>
-    <p:sldId id="270" r:id="rId19"/>
-    <p:sldId id="271" r:id="rId20"/>
-    <p:sldId id="272" r:id="rId21"/>
-    <p:sldId id="267" r:id="rId22"/>
-    <p:sldId id="268" r:id="rId23"/>
-    <p:sldId id="277" r:id="rId24"/>
-    <p:sldId id="259" r:id="rId25"/>
+    <p:sldId id="273" r:id="rId10"/>
+    <p:sldId id="269" r:id="rId11"/>
+    <p:sldId id="262" r:id="rId12"/>
+    <p:sldId id="261" r:id="rId13"/>
+    <p:sldId id="263" r:id="rId14"/>
+    <p:sldId id="264" r:id="rId15"/>
+    <p:sldId id="265" r:id="rId16"/>
+    <p:sldId id="266" r:id="rId17"/>
+    <p:sldId id="270" r:id="rId18"/>
+    <p:sldId id="271" r:id="rId19"/>
+    <p:sldId id="272" r:id="rId20"/>
+    <p:sldId id="267" r:id="rId21"/>
+    <p:sldId id="268" r:id="rId22"/>
+    <p:sldId id="284" r:id="rId23"/>
+    <p:sldId id="285" r:id="rId24"/>
+    <p:sldId id="286" r:id="rId25"/>
+    <p:sldId id="291" r:id="rId26"/>
+    <p:sldId id="292" r:id="rId27"/>
+    <p:sldId id="288" r:id="rId28"/>
+    <p:sldId id="289" r:id="rId29"/>
+    <p:sldId id="290" r:id="rId30"/>
+    <p:sldId id="277" r:id="rId31"/>
+    <p:sldId id="259" r:id="rId32"/>
   </p:sldIdLst>
   <p:sldSz cx="9144000" cy="5143500" type="screen16x9"/>
   <p:notesSz cx="6858000" cy="9144000"/>
@@ -215,7 +222,7 @@
           <a:p>
             <a:fld id="{F4CC630C-9AF6-49E5-9919-D038F5C57BFC}" type="datetimeFigureOut">
               <a:rPr lang="en-US" smtClean="0"/>
-              <a:t>3/3/2021</a:t>
+              <a:t>3/8/2021</a:t>
             </a:fld>
             <a:endParaRPr lang="en-US"/>
           </a:p>
@@ -664,7 +671,7 @@
           <a:p>
             <a:fld id="{F19922E3-32CA-40BB-949D-A04DA951D7AE}" type="datetimeFigureOut">
               <a:rPr lang="en-US" smtClean="0"/>
-              <a:t>3/3/2021</a:t>
+              <a:t>3/8/2021</a:t>
             </a:fld>
             <a:endParaRPr lang="en-US"/>
           </a:p>
@@ -834,7 +841,7 @@
           <a:p>
             <a:fld id="{F19922E3-32CA-40BB-949D-A04DA951D7AE}" type="datetimeFigureOut">
               <a:rPr lang="en-US" smtClean="0"/>
-              <a:t>3/3/2021</a:t>
+              <a:t>3/8/2021</a:t>
             </a:fld>
             <a:endParaRPr lang="en-US"/>
           </a:p>
@@ -1014,7 +1021,7 @@
           <a:p>
             <a:fld id="{F19922E3-32CA-40BB-949D-A04DA951D7AE}" type="datetimeFigureOut">
               <a:rPr lang="en-US" smtClean="0"/>
-              <a:t>3/3/2021</a:t>
+              <a:t>3/8/2021</a:t>
             </a:fld>
             <a:endParaRPr lang="en-US"/>
           </a:p>
@@ -1184,7 +1191,7 @@
           <a:p>
             <a:fld id="{F19922E3-32CA-40BB-949D-A04DA951D7AE}" type="datetimeFigureOut">
               <a:rPr lang="en-US" smtClean="0"/>
-              <a:t>3/3/2021</a:t>
+              <a:t>3/8/2021</a:t>
             </a:fld>
             <a:endParaRPr lang="en-US"/>
           </a:p>
@@ -1430,7 +1437,7 @@
           <a:p>
             <a:fld id="{F19922E3-32CA-40BB-949D-A04DA951D7AE}" type="datetimeFigureOut">
               <a:rPr lang="en-US" smtClean="0"/>
-              <a:t>3/3/2021</a:t>
+              <a:t>3/8/2021</a:t>
             </a:fld>
             <a:endParaRPr lang="en-US"/>
           </a:p>
@@ -1718,7 +1725,7 @@
           <a:p>
             <a:fld id="{F19922E3-32CA-40BB-949D-A04DA951D7AE}" type="datetimeFigureOut">
               <a:rPr lang="en-US" smtClean="0"/>
-              <a:t>3/3/2021</a:t>
+              <a:t>3/8/2021</a:t>
             </a:fld>
             <a:endParaRPr lang="en-US"/>
           </a:p>
@@ -2145,7 +2152,7 @@
           <a:p>
             <a:fld id="{F19922E3-32CA-40BB-949D-A04DA951D7AE}" type="datetimeFigureOut">
               <a:rPr lang="en-US" smtClean="0"/>
-              <a:t>3/3/2021</a:t>
+              <a:t>3/8/2021</a:t>
             </a:fld>
             <a:endParaRPr lang="en-US"/>
           </a:p>
@@ -2263,7 +2270,7 @@
           <a:p>
             <a:fld id="{F19922E3-32CA-40BB-949D-A04DA951D7AE}" type="datetimeFigureOut">
               <a:rPr lang="en-US" smtClean="0"/>
-              <a:t>3/3/2021</a:t>
+              <a:t>3/8/2021</a:t>
             </a:fld>
             <a:endParaRPr lang="en-US"/>
           </a:p>
@@ -2358,7 +2365,7 @@
           <a:p>
             <a:fld id="{F19922E3-32CA-40BB-949D-A04DA951D7AE}" type="datetimeFigureOut">
               <a:rPr lang="en-US" smtClean="0"/>
-              <a:t>3/3/2021</a:t>
+              <a:t>3/8/2021</a:t>
             </a:fld>
             <a:endParaRPr lang="en-US"/>
           </a:p>
@@ -2635,7 +2642,7 @@
           <a:p>
             <a:fld id="{F19922E3-32CA-40BB-949D-A04DA951D7AE}" type="datetimeFigureOut">
               <a:rPr lang="en-US" smtClean="0"/>
-              <a:t>3/3/2021</a:t>
+              <a:t>3/8/2021</a:t>
             </a:fld>
             <a:endParaRPr lang="en-US"/>
           </a:p>
@@ -2888,7 +2895,7 @@
           <a:p>
             <a:fld id="{F19922E3-32CA-40BB-949D-A04DA951D7AE}" type="datetimeFigureOut">
               <a:rPr lang="en-US" smtClean="0"/>
-              <a:t>3/3/2021</a:t>
+              <a:t>3/8/2021</a:t>
             </a:fld>
             <a:endParaRPr lang="en-US"/>
           </a:p>
@@ -3110,7 +3117,7 @@
           <a:p>
             <a:fld id="{F19922E3-32CA-40BB-949D-A04DA951D7AE}" type="datetimeFigureOut">
               <a:rPr lang="en-US" smtClean="0"/>
-              <a:t>3/3/2021</a:t>
+              <a:t>3/8/2021</a:t>
             </a:fld>
             <a:endParaRPr lang="en-US"/>
           </a:p>
@@ -3596,14 +3603,7 @@
                 <a:latin typeface="Verdana" panose="020B0604030504040204" pitchFamily="34" charset="0"/>
                 <a:ea typeface="Verdana" panose="020B0604030504040204" pitchFamily="34" charset="0"/>
               </a:rPr>
-              <a:t>TARNÓW </a:t>
-            </a:r>
-            <a:r>
-              <a:rPr lang="pl-PL" dirty="0" smtClean="0">
-                <a:latin typeface="Verdana" panose="020B0604030504040204" pitchFamily="34" charset="0"/>
-                <a:ea typeface="Verdana" panose="020B0604030504040204" pitchFamily="34" charset="0"/>
-              </a:rPr>
-              <a:t>2021</a:t>
+              <a:t>TARNÓW 2021</a:t>
             </a:r>
             <a:endParaRPr lang="en-US" dirty="0">
               <a:latin typeface="Verdana" panose="020B0604030504040204" pitchFamily="34" charset="0"/>
@@ -3626,115 +3626,6 @@
 </file>
 
 <file path=ppt/slides/slide10.xml><?xml version="1.0" encoding="utf-8"?>
-<p:sld xmlns:a="http://schemas.openxmlformats.org/drawingml/2006/main" xmlns:r="http://schemas.openxmlformats.org/officeDocument/2006/relationships" xmlns:p="http://schemas.openxmlformats.org/presentationml/2006/main">
-  <p:cSld>
-    <p:spTree>
-      <p:nvGrpSpPr>
-        <p:cNvPr id="1" name=""/>
-        <p:cNvGrpSpPr/>
-        <p:nvPr/>
-      </p:nvGrpSpPr>
-      <p:grpSpPr>
-        <a:xfrm>
-          <a:off x="0" y="0"/>
-          <a:ext cx="0" cy="0"/>
-          <a:chOff x="0" y="0"/>
-          <a:chExt cx="0" cy="0"/>
-        </a:xfrm>
-      </p:grpSpPr>
-      <p:sp>
-        <p:nvSpPr>
-          <p:cNvPr id="3" name="Symbol zastępczy zawartości 2"/>
-          <p:cNvSpPr>
-            <a:spLocks noGrp="1"/>
-          </p:cNvSpPr>
-          <p:nvPr>
-            <p:ph idx="1"/>
-          </p:nvPr>
-        </p:nvSpPr>
-        <p:spPr/>
-        <p:txBody>
-          <a:bodyPr>
-            <a:normAutofit/>
-          </a:bodyPr>
-          <a:lstStyle/>
-          <a:p>
-            <a:pPr marL="0" indent="0">
-              <a:buNone/>
-            </a:pPr>
-            <a:r>
-              <a:rPr lang="pl-PL" sz="1800" b="1" dirty="0" smtClean="0"/>
-              <a:t>Metodyki wytwarzania oprogramowania</a:t>
-            </a:r>
-          </a:p>
-        </p:txBody>
-      </p:sp>
-      <p:pic>
-        <p:nvPicPr>
-          <p:cNvPr id="1034" name="Picture 10"/>
-          <p:cNvPicPr>
-            <a:picLocks noChangeAspect="1" noChangeArrowheads="1"/>
-          </p:cNvPicPr>
-          <p:nvPr/>
-        </p:nvPicPr>
-        <p:blipFill rotWithShape="1">
-          <a:blip r:embed="rId2" cstate="print">
-            <a:extLst>
-              <a:ext uri="{28A0092B-C50C-407E-A947-70E740481C1C}">
-                <a14:useLocalDpi xmlns:a14="http://schemas.microsoft.com/office/drawing/2010/main" val="0"/>
-              </a:ext>
-            </a:extLst>
-          </a:blip>
-          <a:srcRect b="9385"/>
-          <a:stretch/>
-        </p:blipFill>
-        <p:spPr bwMode="auto">
-          <a:xfrm>
-            <a:off x="683568" y="1635646"/>
-            <a:ext cx="4618043" cy="2494920"/>
-          </a:xfrm>
-          <a:prstGeom prst="rect">
-            <a:avLst/>
-          </a:prstGeom>
-          <a:noFill/>
-          <a:ln>
-            <a:noFill/>
-          </a:ln>
-          <a:extLst>
-            <a:ext uri="{909E8E84-426E-40DD-AFC4-6F175D3DCCD1}">
-              <a14:hiddenFill xmlns:a14="http://schemas.microsoft.com/office/drawing/2010/main">
-                <a:solidFill>
-                  <a:schemeClr val="accent1"/>
-                </a:solidFill>
-              </a14:hiddenFill>
-            </a:ext>
-            <a:ext uri="{91240B29-F687-4F45-9708-019B960494DF}">
-              <a14:hiddenLine xmlns:a14="http://schemas.microsoft.com/office/drawing/2010/main" w="9525">
-                <a:solidFill>
-                  <a:schemeClr val="tx1"/>
-                </a:solidFill>
-                <a:miter lim="800000"/>
-                <a:headEnd/>
-                <a:tailEnd/>
-              </a14:hiddenLine>
-            </a:ext>
-          </a:extLst>
-        </p:spPr>
-      </p:pic>
-    </p:spTree>
-    <p:extLst>
-      <p:ext uri="{BB962C8B-B14F-4D97-AF65-F5344CB8AC3E}">
-        <p14:creationId xmlns:p14="http://schemas.microsoft.com/office/powerpoint/2010/main" val="3431002324"/>
-      </p:ext>
-    </p:extLst>
-  </p:cSld>
-  <p:clrMapOvr>
-    <a:masterClrMapping/>
-  </p:clrMapOvr>
-</p:sld>
-</file>
-
-<file path=ppt/slides/slide11.xml><?xml version="1.0" encoding="utf-8"?>
 <p:sld xmlns:a="http://schemas.openxmlformats.org/drawingml/2006/main" xmlns:r="http://schemas.openxmlformats.org/officeDocument/2006/relationships" xmlns:p="http://schemas.openxmlformats.org/presentationml/2006/main">
   <p:cSld>
     <p:spTree>
@@ -3980,7 +3871,7 @@
 </p:sld>
 </file>
 
-<file path=ppt/slides/slide12.xml><?xml version="1.0" encoding="utf-8"?>
+<file path=ppt/slides/slide11.xml><?xml version="1.0" encoding="utf-8"?>
 <p:sld xmlns:a="http://schemas.openxmlformats.org/drawingml/2006/main" xmlns:r="http://schemas.openxmlformats.org/officeDocument/2006/relationships" xmlns:p="http://schemas.openxmlformats.org/presentationml/2006/main">
   <p:cSld>
     <p:spTree>
@@ -4130,7 +4021,7 @@
 </p:sld>
 </file>
 
-<file path=ppt/slides/slide13.xml><?xml version="1.0" encoding="utf-8"?>
+<file path=ppt/slides/slide12.xml><?xml version="1.0" encoding="utf-8"?>
 <p:sld xmlns:a="http://schemas.openxmlformats.org/drawingml/2006/main" xmlns:r="http://schemas.openxmlformats.org/officeDocument/2006/relationships" xmlns:p="http://schemas.openxmlformats.org/presentationml/2006/main">
   <p:cSld>
     <p:spTree>
@@ -4229,7 +4120,7 @@
 </p:sld>
 </file>
 
-<file path=ppt/slides/slide14.xml><?xml version="1.0" encoding="utf-8"?>
+<file path=ppt/slides/slide13.xml><?xml version="1.0" encoding="utf-8"?>
 <p:sld xmlns:a="http://schemas.openxmlformats.org/drawingml/2006/main" xmlns:r="http://schemas.openxmlformats.org/officeDocument/2006/relationships" xmlns:p="http://schemas.openxmlformats.org/presentationml/2006/main">
   <p:cSld>
     <p:spTree>
@@ -4328,7 +4219,7 @@
 </p:sld>
 </file>
 
-<file path=ppt/slides/slide15.xml><?xml version="1.0" encoding="utf-8"?>
+<file path=ppt/slides/slide14.xml><?xml version="1.0" encoding="utf-8"?>
 <p:sld xmlns:a="http://schemas.openxmlformats.org/drawingml/2006/main" xmlns:r="http://schemas.openxmlformats.org/officeDocument/2006/relationships" xmlns:p="http://schemas.openxmlformats.org/presentationml/2006/main">
   <p:cSld>
     <p:spTree>
@@ -4420,7 +4311,7 @@
 </p:sld>
 </file>
 
-<file path=ppt/slides/slide16.xml><?xml version="1.0" encoding="utf-8"?>
+<file path=ppt/slides/slide15.xml><?xml version="1.0" encoding="utf-8"?>
 <p:sld xmlns:a="http://schemas.openxmlformats.org/drawingml/2006/main" xmlns:r="http://schemas.openxmlformats.org/officeDocument/2006/relationships" xmlns:p="http://schemas.openxmlformats.org/presentationml/2006/main">
   <p:cSld>
     <p:spTree>
@@ -4512,7 +4403,7 @@
 </p:sld>
 </file>
 
-<file path=ppt/slides/slide17.xml><?xml version="1.0" encoding="utf-8"?>
+<file path=ppt/slides/slide16.xml><?xml version="1.0" encoding="utf-8"?>
 <p:sld xmlns:a="http://schemas.openxmlformats.org/drawingml/2006/main" xmlns:r="http://schemas.openxmlformats.org/officeDocument/2006/relationships" xmlns:p="http://schemas.openxmlformats.org/presentationml/2006/main">
   <p:cSld>
     <p:spTree>
@@ -4604,6 +4495,229 @@
 </p:sld>
 </file>
 
+<file path=ppt/slides/slide17.xml><?xml version="1.0" encoding="utf-8"?>
+<p:sld xmlns:a="http://schemas.openxmlformats.org/drawingml/2006/main" xmlns:r="http://schemas.openxmlformats.org/officeDocument/2006/relationships" xmlns:p="http://schemas.openxmlformats.org/presentationml/2006/main">
+  <p:cSld>
+    <p:spTree>
+      <p:nvGrpSpPr>
+        <p:cNvPr id="1" name=""/>
+        <p:cNvGrpSpPr/>
+        <p:nvPr/>
+      </p:nvGrpSpPr>
+      <p:grpSpPr>
+        <a:xfrm>
+          <a:off x="0" y="0"/>
+          <a:ext cx="0" cy="0"/>
+          <a:chOff x="0" y="0"/>
+          <a:chExt cx="0" cy="0"/>
+        </a:xfrm>
+      </p:grpSpPr>
+      <p:sp>
+        <p:nvSpPr>
+          <p:cNvPr id="3" name="Symbol zastępczy zawartości 2"/>
+          <p:cNvSpPr>
+            <a:spLocks noGrp="1"/>
+          </p:cNvSpPr>
+          <p:nvPr>
+            <p:ph idx="1"/>
+          </p:nvPr>
+        </p:nvSpPr>
+        <p:spPr/>
+        <p:txBody>
+          <a:bodyPr>
+            <a:normAutofit/>
+          </a:bodyPr>
+          <a:lstStyle/>
+          <a:p>
+            <a:pPr marL="0" indent="0">
+              <a:buNone/>
+            </a:pPr>
+            <a:r>
+              <a:rPr lang="pl-PL" sz="1800" b="1" dirty="0" smtClean="0"/>
+              <a:t>Polecenia</a:t>
+            </a:r>
+          </a:p>
+          <a:p>
+            <a:r>
+              <a:rPr lang="pl-PL" sz="1200" b="1" dirty="0" smtClean="0"/>
+              <a:t>Konfiguracja Git</a:t>
+            </a:r>
+          </a:p>
+          <a:p>
+            <a:pPr marL="400050" lvl="1" indent="0">
+              <a:buNone/>
+            </a:pPr>
+            <a:r>
+              <a:rPr lang="pl-PL" sz="600" dirty="0">
+                <a:hlinkClick r:id="rId2"/>
+              </a:rPr>
+              <a:t>https://</a:t>
+            </a:r>
+            <a:r>
+              <a:rPr lang="pl-PL" sz="600" dirty="0" smtClean="0">
+                <a:hlinkClick r:id="rId2"/>
+              </a:rPr>
+              <a:t>www.atlassian.com/git/tutorials/setting-up-a-repository/git-config</a:t>
+            </a:r>
+            <a:endParaRPr lang="pl-PL" sz="600" dirty="0" smtClean="0"/>
+          </a:p>
+          <a:p>
+            <a:pPr lvl="1">
+              <a:buFont typeface="Wingdings" panose="05000000000000000000" pitchFamily="2" charset="2"/>
+              <a:buChar char="§"/>
+            </a:pPr>
+            <a:r>
+              <a:rPr lang="fr-FR" sz="800" dirty="0"/>
+              <a:t>git --version</a:t>
+            </a:r>
+          </a:p>
+          <a:p>
+            <a:pPr lvl="1">
+              <a:buFont typeface="Wingdings" panose="05000000000000000000" pitchFamily="2" charset="2"/>
+              <a:buChar char="§"/>
+            </a:pPr>
+            <a:r>
+              <a:rPr lang="fr-FR" sz="800" dirty="0"/>
+              <a:t>git config </a:t>
+            </a:r>
+            <a:r>
+              <a:rPr lang="fr-FR" sz="800" dirty="0" smtClean="0"/>
+              <a:t>–list</a:t>
+            </a:r>
+            <a:endParaRPr lang="pl-PL" sz="800" dirty="0" smtClean="0"/>
+          </a:p>
+          <a:p>
+            <a:pPr marL="457200" lvl="1" indent="0">
+              <a:buNone/>
+            </a:pPr>
+            <a:r>
+              <a:rPr lang="pl-PL" sz="800" dirty="0" smtClean="0"/>
+              <a:t>GitLab </a:t>
+            </a:r>
+            <a:endParaRPr lang="pl-PL" sz="800" dirty="0"/>
+          </a:p>
+          <a:p>
+            <a:pPr lvl="1">
+              <a:buFont typeface="Wingdings" panose="05000000000000000000" pitchFamily="2" charset="2"/>
+              <a:buChar char="§"/>
+            </a:pPr>
+            <a:r>
+              <a:rPr lang="en-US" sz="800" dirty="0" err="1"/>
+              <a:t>git</a:t>
+            </a:r>
+            <a:r>
+              <a:rPr lang="en-US" sz="800" dirty="0"/>
+              <a:t> </a:t>
+            </a:r>
+            <a:r>
+              <a:rPr lang="en-US" sz="800" dirty="0" err="1"/>
+              <a:t>config</a:t>
+            </a:r>
+            <a:r>
+              <a:rPr lang="en-US" sz="800" dirty="0"/>
+              <a:t> --global user.name "Your </a:t>
+            </a:r>
+            <a:r>
+              <a:rPr lang="en-US" sz="800" dirty="0" smtClean="0"/>
+              <a:t>Name</a:t>
+            </a:r>
+            <a:r>
+              <a:rPr lang="pl-PL" sz="800" dirty="0" smtClean="0"/>
+              <a:t>”</a:t>
+            </a:r>
+          </a:p>
+          <a:p>
+            <a:pPr lvl="1">
+              <a:buFont typeface="Wingdings" panose="05000000000000000000" pitchFamily="2" charset="2"/>
+              <a:buChar char="§"/>
+            </a:pPr>
+            <a:r>
+              <a:rPr lang="en-US" sz="800" dirty="0" err="1" smtClean="0"/>
+              <a:t>git</a:t>
+            </a:r>
+            <a:r>
+              <a:rPr lang="en-US" sz="800" dirty="0" smtClean="0"/>
+              <a:t> </a:t>
+            </a:r>
+            <a:r>
+              <a:rPr lang="en-US" sz="800" dirty="0" err="1"/>
+              <a:t>config</a:t>
+            </a:r>
+            <a:r>
+              <a:rPr lang="en-US" sz="800" dirty="0"/>
+              <a:t> --global </a:t>
+            </a:r>
+            <a:r>
+              <a:rPr lang="en-US" sz="800" dirty="0" err="1"/>
+              <a:t>user.email</a:t>
+            </a:r>
+            <a:r>
+              <a:rPr lang="en-US" sz="800" dirty="0"/>
+              <a:t> </a:t>
+            </a:r>
+            <a:r>
+              <a:rPr lang="en-US" sz="800" dirty="0" smtClean="0">
+                <a:hlinkClick r:id="rId3"/>
+              </a:rPr>
+              <a:t>you@example.com</a:t>
+            </a:r>
+            <a:endParaRPr lang="pl-PL" sz="800" dirty="0" smtClean="0"/>
+          </a:p>
+          <a:p>
+            <a:pPr marL="457200" lvl="1" indent="0">
+              <a:buNone/>
+            </a:pPr>
+            <a:endParaRPr lang="pl-PL" sz="800" dirty="0" smtClean="0"/>
+          </a:p>
+          <a:p>
+            <a:pPr marL="342900" lvl="1" indent="-342900">
+              <a:buFont typeface="Arial" panose="020B0604020202020204" pitchFamily="34" charset="0"/>
+              <a:buChar char="•"/>
+            </a:pPr>
+            <a:r>
+              <a:rPr lang="pl-PL" sz="1200" b="1" dirty="0"/>
+              <a:t>Status repozytorium</a:t>
+            </a:r>
+            <a:endParaRPr lang="fr-FR" sz="1200" b="1" dirty="0"/>
+          </a:p>
+          <a:p>
+            <a:pPr lvl="1">
+              <a:buFont typeface="Wingdings" panose="05000000000000000000" pitchFamily="2" charset="2"/>
+              <a:buChar char="§"/>
+            </a:pPr>
+            <a:r>
+              <a:rPr lang="pl-PL" sz="800" dirty="0"/>
+              <a:t>git log</a:t>
+            </a:r>
+          </a:p>
+          <a:p>
+            <a:pPr lvl="1">
+              <a:buFont typeface="Wingdings" panose="05000000000000000000" pitchFamily="2" charset="2"/>
+              <a:buChar char="§"/>
+            </a:pPr>
+            <a:r>
+              <a:rPr lang="pl-PL" sz="800" dirty="0"/>
+              <a:t>git status</a:t>
+            </a:r>
+          </a:p>
+          <a:p>
+            <a:endParaRPr lang="en-US" sz="1200" dirty="0"/>
+          </a:p>
+        </p:txBody>
+      </p:sp>
+    </p:spTree>
+    <p:extLst>
+      <p:ext uri="{BB962C8B-B14F-4D97-AF65-F5344CB8AC3E}">
+        <p14:creationId xmlns:p14="http://schemas.microsoft.com/office/powerpoint/2010/main" val="2453797946"/>
+      </p:ext>
+    </p:extLst>
+  </p:cSld>
+  <p:clrMapOvr>
+    <a:masterClrMapping/>
+  </p:clrMapOvr>
+</p:sld>
+</file>
+
 <file path=ppt/slides/slide18.xml><?xml version="1.0" encoding="utf-8"?>
 <p:sld xmlns:a="http://schemas.openxmlformats.org/drawingml/2006/main" xmlns:r="http://schemas.openxmlformats.org/officeDocument/2006/relationships" xmlns:p="http://schemas.openxmlformats.org/presentationml/2006/main">
   <p:cSld>
@@ -4649,7 +4763,7 @@
           <a:p>
             <a:r>
               <a:rPr lang="pl-PL" sz="1200" b="1" dirty="0" smtClean="0"/>
-              <a:t>Konfiguracja Git</a:t>
+              <a:t>Tworzenie</a:t>
             </a:r>
           </a:p>
           <a:p>
@@ -4677,9 +4791,12 @@
             </a:pPr>
             <a:r>
               <a:rPr lang="fr-FR" sz="800" dirty="0"/>
-              <a:t>git --version</a:t>
-            </a:r>
-            <a:endParaRPr lang="fr-FR" sz="800" dirty="0"/>
+              <a:t>git </a:t>
+            </a:r>
+            <a:r>
+              <a:rPr lang="pl-PL" sz="800" dirty="0" smtClean="0"/>
+              <a:t>clone</a:t>
+            </a:r>
           </a:p>
           <a:p>
             <a:pPr lvl="1">
@@ -4687,12 +4804,12 @@
               <a:buChar char="§"/>
             </a:pPr>
             <a:r>
-              <a:rPr lang="fr-FR" sz="800" dirty="0"/>
-              <a:t>git config </a:t>
-            </a:r>
-            <a:r>
               <a:rPr lang="fr-FR" sz="800" dirty="0" smtClean="0"/>
-              <a:t>–list</a:t>
+              <a:t>git </a:t>
+            </a:r>
+            <a:r>
+              <a:rPr lang="pl-PL" sz="800" dirty="0" err="1" smtClean="0"/>
+              <a:t>init</a:t>
             </a:r>
             <a:endParaRPr lang="pl-PL" sz="800" dirty="0" smtClean="0"/>
           </a:p>
@@ -4700,11 +4817,18 @@
             <a:pPr marL="457200" lvl="1" indent="0">
               <a:buNone/>
             </a:pPr>
-            <a:r>
-              <a:rPr lang="pl-PL" sz="800" dirty="0" smtClean="0"/>
-              <a:t>GitLab </a:t>
-            </a:r>
-            <a:endParaRPr lang="pl-PL" sz="800" dirty="0"/>
+            <a:endParaRPr lang="pl-PL" sz="800" dirty="0" smtClean="0"/>
+          </a:p>
+          <a:p>
+            <a:pPr marL="342900" lvl="1" indent="-342900">
+              <a:buFont typeface="Arial" panose="020B0604020202020204" pitchFamily="34" charset="0"/>
+              <a:buChar char="•"/>
+            </a:pPr>
+            <a:r>
+              <a:rPr lang="pl-PL" sz="1200" b="1" dirty="0" smtClean="0"/>
+              <a:t>Podstawowa obsługa</a:t>
+            </a:r>
+            <a:endParaRPr lang="fr-FR" sz="1200" b="1" dirty="0"/>
           </a:p>
           <a:p>
             <a:pPr lvl="1">
@@ -4712,29 +4836,14 @@
               <a:buChar char="§"/>
             </a:pPr>
             <a:r>
-              <a:rPr lang="en-US" sz="800" dirty="0" err="1"/>
-              <a:t>git</a:t>
-            </a:r>
-            <a:r>
-              <a:rPr lang="en-US" sz="800" dirty="0"/>
-              <a:t> </a:t>
-            </a:r>
-            <a:r>
-              <a:rPr lang="en-US" sz="800" dirty="0" err="1"/>
-              <a:t>config</a:t>
-            </a:r>
-            <a:r>
-              <a:rPr lang="en-US" sz="800" dirty="0"/>
-              <a:t> --global user.name "Your </a:t>
-            </a:r>
-            <a:r>
-              <a:rPr lang="en-US" sz="800" dirty="0" smtClean="0"/>
-              <a:t>Name</a:t>
-            </a:r>
-            <a:r>
               <a:rPr lang="pl-PL" sz="800" dirty="0" smtClean="0"/>
-              <a:t>”</a:t>
-            </a:r>
+              <a:t>git </a:t>
+            </a:r>
+            <a:r>
+              <a:rPr lang="pl-PL" sz="800" dirty="0" err="1" smtClean="0"/>
+              <a:t>pull</a:t>
+            </a:r>
+            <a:endParaRPr lang="pl-PL" sz="800" dirty="0" smtClean="0"/>
           </a:p>
           <a:p>
             <a:pPr lvl="1">
@@ -4742,53 +4851,17 @@
               <a:buChar char="§"/>
             </a:pPr>
             <a:r>
-              <a:rPr lang="en-US" sz="800" dirty="0" err="1" smtClean="0"/>
-              <a:t>git</a:t>
-            </a:r>
-            <a:r>
-              <a:rPr lang="en-US" sz="800" dirty="0" smtClean="0"/>
-              <a:t> </a:t>
-            </a:r>
-            <a:r>
-              <a:rPr lang="en-US" sz="800" dirty="0" err="1"/>
-              <a:t>config</a:t>
-            </a:r>
-            <a:r>
-              <a:rPr lang="en-US" sz="800" dirty="0"/>
-              <a:t> --global </a:t>
-            </a:r>
-            <a:r>
-              <a:rPr lang="en-US" sz="800" dirty="0" err="1"/>
-              <a:t>user.email</a:t>
-            </a:r>
-            <a:r>
-              <a:rPr lang="en-US" sz="800" dirty="0"/>
-              <a:t> </a:t>
-            </a:r>
-            <a:r>
-              <a:rPr lang="en-US" sz="800" dirty="0" smtClean="0">
-                <a:hlinkClick r:id="rId3"/>
-              </a:rPr>
-              <a:t>you@example.com</a:t>
-            </a:r>
-            <a:endParaRPr lang="pl-PL" sz="800" dirty="0" smtClean="0"/>
-          </a:p>
-          <a:p>
-            <a:pPr marL="457200" lvl="1" indent="0">
-              <a:buNone/>
-            </a:pPr>
-            <a:endParaRPr lang="pl-PL" sz="800" dirty="0" smtClean="0"/>
-          </a:p>
-          <a:p>
-            <a:pPr marL="342900" lvl="1" indent="-342900">
-              <a:buFont typeface="Arial" panose="020B0604020202020204" pitchFamily="34" charset="0"/>
-              <a:buChar char="•"/>
-            </a:pPr>
-            <a:r>
-              <a:rPr lang="pl-PL" sz="1200" b="1" dirty="0"/>
-              <a:t>Status repozytorium</a:t>
-            </a:r>
-            <a:endParaRPr lang="fr-FR" sz="1200" b="1" dirty="0"/>
+              <a:rPr lang="pl-PL" sz="800" dirty="0" smtClean="0"/>
+              <a:t>git </a:t>
+            </a:r>
+            <a:r>
+              <a:rPr lang="pl-PL" sz="800" dirty="0" err="1"/>
+              <a:t>add</a:t>
+            </a:r>
+            <a:r>
+              <a:rPr lang="pl-PL" sz="800" dirty="0"/>
+              <a:t>  (pojedynczy plik)</a:t>
+            </a:r>
           </a:p>
           <a:p>
             <a:pPr lvl="1">
@@ -4797,7 +4870,31 @@
             </a:pPr>
             <a:r>
               <a:rPr lang="pl-PL" sz="800" dirty="0"/>
-              <a:t>git log</a:t>
+              <a:t>git </a:t>
+            </a:r>
+            <a:r>
+              <a:rPr lang="pl-PL" sz="800" dirty="0" err="1"/>
+              <a:t>add</a:t>
+            </a:r>
+            <a:r>
+              <a:rPr lang="pl-PL" sz="800" dirty="0"/>
+              <a:t> --</a:t>
+            </a:r>
+            <a:r>
+              <a:rPr lang="pl-PL" sz="800" dirty="0" err="1"/>
+              <a:t>all</a:t>
+            </a:r>
+            <a:r>
+              <a:rPr lang="pl-PL" sz="800" dirty="0"/>
+              <a:t> (wszystkie ale </a:t>
+            </a:r>
+            <a:r>
+              <a:rPr lang="pl-PL" sz="800" dirty="0" err="1"/>
+              <a:t>gitignore</a:t>
+            </a:r>
+            <a:r>
+              <a:rPr lang="pl-PL" sz="800" dirty="0"/>
+              <a:t>)</a:t>
             </a:r>
           </a:p>
           <a:p>
@@ -4807,8 +4904,57 @@
             </a:pPr>
             <a:r>
               <a:rPr lang="pl-PL" sz="800" dirty="0"/>
-              <a:t>git status</a:t>
-            </a:r>
+              <a:t>git </a:t>
+            </a:r>
+            <a:r>
+              <a:rPr lang="pl-PL" sz="800" dirty="0" err="1"/>
+              <a:t>commit</a:t>
+            </a:r>
+            <a:r>
+              <a:rPr lang="pl-PL" sz="800" dirty="0"/>
+              <a:t> -m </a:t>
+            </a:r>
+          </a:p>
+          <a:p>
+            <a:pPr lvl="1">
+              <a:buFont typeface="Wingdings" panose="05000000000000000000" pitchFamily="2" charset="2"/>
+              <a:buChar char="§"/>
+            </a:pPr>
+            <a:r>
+              <a:rPr lang="pl-PL" sz="800" dirty="0"/>
+              <a:t>git </a:t>
+            </a:r>
+            <a:r>
+              <a:rPr lang="pl-PL" sz="800" dirty="0" err="1"/>
+              <a:t>commit</a:t>
+            </a:r>
+            <a:r>
+              <a:rPr lang="pl-PL" sz="800" dirty="0"/>
+              <a:t> -</a:t>
+            </a:r>
+            <a:r>
+              <a:rPr lang="pl-PL" sz="800" dirty="0" err="1"/>
+              <a:t>am</a:t>
+            </a:r>
+            <a:r>
+              <a:rPr lang="pl-PL" sz="800" dirty="0"/>
+              <a:t> (wszystkie zmienione pliki; nie nowe)</a:t>
+            </a:r>
+          </a:p>
+          <a:p>
+            <a:pPr lvl="1">
+              <a:buFont typeface="Wingdings" panose="05000000000000000000" pitchFamily="2" charset="2"/>
+              <a:buChar char="§"/>
+            </a:pPr>
+            <a:r>
+              <a:rPr lang="pl-PL" sz="800" dirty="0"/>
+              <a:t>git </a:t>
+            </a:r>
+            <a:r>
+              <a:rPr lang="pl-PL" sz="800" dirty="0" err="1"/>
+              <a:t>push</a:t>
+            </a:r>
+            <a:endParaRPr lang="pl-PL" sz="800" dirty="0"/>
           </a:p>
           <a:p>
             <a:endParaRPr lang="en-US" sz="1200" dirty="0"/>
@@ -4818,7 +4964,7 @@
     </p:spTree>
     <p:extLst>
       <p:ext uri="{BB962C8B-B14F-4D97-AF65-F5344CB8AC3E}">
-        <p14:creationId xmlns:p14="http://schemas.microsoft.com/office/powerpoint/2010/main" val="2453797946"/>
+        <p14:creationId xmlns:p14="http://schemas.microsoft.com/office/powerpoint/2010/main" val="1483758993"/>
       </p:ext>
     </p:extLst>
   </p:cSld>
@@ -4873,26 +5019,8 @@
           <a:p>
             <a:r>
               <a:rPr lang="pl-PL" sz="1200" b="1" dirty="0" smtClean="0"/>
-              <a:t>Tworzenie</a:t>
-            </a:r>
-          </a:p>
-          <a:p>
-            <a:pPr marL="400050" lvl="1" indent="0">
-              <a:buNone/>
-            </a:pPr>
-            <a:r>
-              <a:rPr lang="pl-PL" sz="600" dirty="0">
-                <a:hlinkClick r:id="rId2"/>
-              </a:rPr>
-              <a:t>https://</a:t>
-            </a:r>
-            <a:r>
-              <a:rPr lang="pl-PL" sz="600" dirty="0" smtClean="0">
-                <a:hlinkClick r:id="rId2"/>
-              </a:rPr>
-              <a:t>www.atlassian.com/git/tutorials/setting-up-a-repository/git-config</a:t>
-            </a:r>
-            <a:endParaRPr lang="pl-PL" sz="600" dirty="0" smtClean="0"/>
+              <a:t>Rozwój aplikacji - gałęzie</a:t>
+            </a:r>
           </a:p>
           <a:p>
             <a:pPr lvl="1">
@@ -4901,11 +5029,7 @@
             </a:pPr>
             <a:r>
               <a:rPr lang="fr-FR" sz="800" dirty="0"/>
-              <a:t>git </a:t>
-            </a:r>
-            <a:r>
-              <a:rPr lang="pl-PL" sz="800" dirty="0" smtClean="0"/>
-              <a:t>clone</a:t>
+              <a:t>git checkout nazwa_brancha</a:t>
             </a:r>
           </a:p>
           <a:p>
@@ -4914,14 +5038,29 @@
               <a:buChar char="§"/>
             </a:pPr>
             <a:r>
-              <a:rPr lang="fr-FR" sz="800" dirty="0" smtClean="0"/>
-              <a:t>git </a:t>
-            </a:r>
-            <a:r>
-              <a:rPr lang="pl-PL" sz="800" dirty="0" err="1" smtClean="0"/>
-              <a:t>init</a:t>
-            </a:r>
-            <a:endParaRPr lang="pl-PL" sz="800" dirty="0" smtClean="0"/>
+              <a:rPr lang="fr-FR" sz="800" dirty="0"/>
+              <a:t>git checkout -b”nowy_branch”</a:t>
+            </a:r>
+          </a:p>
+          <a:p>
+            <a:pPr lvl="1">
+              <a:buFont typeface="Wingdings" panose="05000000000000000000" pitchFamily="2" charset="2"/>
+              <a:buChar char="§"/>
+            </a:pPr>
+            <a:r>
+              <a:rPr lang="fr-FR" sz="800" dirty="0"/>
+              <a:t>git checkout -</a:t>
+            </a:r>
+          </a:p>
+          <a:p>
+            <a:pPr lvl="1">
+              <a:buFont typeface="Wingdings" panose="05000000000000000000" pitchFamily="2" charset="2"/>
+              <a:buChar char="§"/>
+            </a:pPr>
+            <a:r>
+              <a:rPr lang="fr-FR" sz="800" dirty="0"/>
+              <a:t>git checkout nazwa_pliku</a:t>
+            </a:r>
           </a:p>
           <a:p>
             <a:pPr marL="457200" lvl="1" indent="0">
@@ -5074,7 +5213,7 @@
     </p:spTree>
     <p:extLst>
       <p:ext uri="{BB962C8B-B14F-4D97-AF65-F5344CB8AC3E}">
-        <p14:creationId xmlns:p14="http://schemas.microsoft.com/office/powerpoint/2010/main" val="1483758993"/>
+        <p14:creationId xmlns:p14="http://schemas.microsoft.com/office/powerpoint/2010/main" val="818339168"/>
       </p:ext>
     </p:extLst>
   </p:cSld>
@@ -5221,251 +5360,9 @@
             </a:pPr>
             <a:r>
               <a:rPr lang="pl-PL" sz="1800" b="1" dirty="0" smtClean="0"/>
-              <a:t>Polecenia</a:t>
-            </a:r>
-          </a:p>
-          <a:p>
-            <a:r>
-              <a:rPr lang="pl-PL" sz="1200" b="1" dirty="0" smtClean="0"/>
-              <a:t>Rozwój aplikacji - gałęzie</a:t>
-            </a:r>
-          </a:p>
-          <a:p>
-            <a:pPr lvl="1">
-              <a:buFont typeface="Wingdings" panose="05000000000000000000" pitchFamily="2" charset="2"/>
-              <a:buChar char="§"/>
-            </a:pPr>
-            <a:r>
-              <a:rPr lang="fr-FR" sz="800" dirty="0"/>
-              <a:t>git checkout nazwa_brancha</a:t>
-            </a:r>
-          </a:p>
-          <a:p>
-            <a:pPr lvl="1">
-              <a:buFont typeface="Wingdings" panose="05000000000000000000" pitchFamily="2" charset="2"/>
-              <a:buChar char="§"/>
-            </a:pPr>
-            <a:r>
-              <a:rPr lang="fr-FR" sz="800" dirty="0"/>
-              <a:t>git checkout -b”nowy_branch”</a:t>
-            </a:r>
-          </a:p>
-          <a:p>
-            <a:pPr lvl="1">
-              <a:buFont typeface="Wingdings" panose="05000000000000000000" pitchFamily="2" charset="2"/>
-              <a:buChar char="§"/>
-            </a:pPr>
-            <a:r>
-              <a:rPr lang="fr-FR" sz="800" dirty="0"/>
-              <a:t>git checkout -</a:t>
-            </a:r>
-          </a:p>
-          <a:p>
-            <a:pPr lvl="1">
-              <a:buFont typeface="Wingdings" panose="05000000000000000000" pitchFamily="2" charset="2"/>
-              <a:buChar char="§"/>
-            </a:pPr>
-            <a:r>
-              <a:rPr lang="fr-FR" sz="800" dirty="0"/>
-              <a:t>git checkout nazwa_pliku</a:t>
-            </a:r>
-          </a:p>
-          <a:p>
-            <a:pPr marL="457200" lvl="1" indent="0">
-              <a:buNone/>
-            </a:pPr>
-            <a:endParaRPr lang="pl-PL" sz="800" dirty="0" smtClean="0"/>
-          </a:p>
-          <a:p>
-            <a:pPr marL="342900" lvl="1" indent="-342900">
-              <a:buFont typeface="Arial" panose="020B0604020202020204" pitchFamily="34" charset="0"/>
-              <a:buChar char="•"/>
-            </a:pPr>
-            <a:r>
-              <a:rPr lang="pl-PL" sz="1200" b="1" dirty="0" smtClean="0"/>
-              <a:t>Podstawowa obsługa</a:t>
-            </a:r>
-            <a:endParaRPr lang="fr-FR" sz="1200" b="1" dirty="0"/>
-          </a:p>
-          <a:p>
-            <a:pPr lvl="1">
-              <a:buFont typeface="Wingdings" panose="05000000000000000000" pitchFamily="2" charset="2"/>
-              <a:buChar char="§"/>
-            </a:pPr>
-            <a:r>
-              <a:rPr lang="pl-PL" sz="800" dirty="0" smtClean="0"/>
-              <a:t>git </a:t>
-            </a:r>
-            <a:r>
-              <a:rPr lang="pl-PL" sz="800" dirty="0" err="1" smtClean="0"/>
-              <a:t>pull</a:t>
-            </a:r>
-            <a:endParaRPr lang="pl-PL" sz="800" dirty="0" smtClean="0"/>
-          </a:p>
-          <a:p>
-            <a:pPr lvl="1">
-              <a:buFont typeface="Wingdings" panose="05000000000000000000" pitchFamily="2" charset="2"/>
-              <a:buChar char="§"/>
-            </a:pPr>
-            <a:r>
-              <a:rPr lang="pl-PL" sz="800" dirty="0" smtClean="0"/>
-              <a:t>git </a:t>
-            </a:r>
-            <a:r>
-              <a:rPr lang="pl-PL" sz="800" dirty="0" err="1"/>
-              <a:t>add</a:t>
-            </a:r>
-            <a:r>
-              <a:rPr lang="pl-PL" sz="800" dirty="0"/>
-              <a:t>  (pojedynczy plik)</a:t>
-            </a:r>
-          </a:p>
-          <a:p>
-            <a:pPr lvl="1">
-              <a:buFont typeface="Wingdings" panose="05000000000000000000" pitchFamily="2" charset="2"/>
-              <a:buChar char="§"/>
-            </a:pPr>
-            <a:r>
-              <a:rPr lang="pl-PL" sz="800" dirty="0"/>
-              <a:t>git </a:t>
-            </a:r>
-            <a:r>
-              <a:rPr lang="pl-PL" sz="800" dirty="0" err="1"/>
-              <a:t>add</a:t>
-            </a:r>
-            <a:r>
-              <a:rPr lang="pl-PL" sz="800" dirty="0"/>
-              <a:t> --</a:t>
-            </a:r>
-            <a:r>
-              <a:rPr lang="pl-PL" sz="800" dirty="0" err="1"/>
-              <a:t>all</a:t>
-            </a:r>
-            <a:r>
-              <a:rPr lang="pl-PL" sz="800" dirty="0"/>
-              <a:t> (wszystkie ale </a:t>
-            </a:r>
-            <a:r>
-              <a:rPr lang="pl-PL" sz="800" dirty="0" err="1"/>
-              <a:t>gitignore</a:t>
-            </a:r>
-            <a:r>
-              <a:rPr lang="pl-PL" sz="800" dirty="0"/>
-              <a:t>)</a:t>
-            </a:r>
-          </a:p>
-          <a:p>
-            <a:pPr lvl="1">
-              <a:buFont typeface="Wingdings" panose="05000000000000000000" pitchFamily="2" charset="2"/>
-              <a:buChar char="§"/>
-            </a:pPr>
-            <a:r>
-              <a:rPr lang="pl-PL" sz="800" dirty="0"/>
-              <a:t>git </a:t>
-            </a:r>
-            <a:r>
-              <a:rPr lang="pl-PL" sz="800" dirty="0" err="1"/>
-              <a:t>commit</a:t>
-            </a:r>
-            <a:r>
-              <a:rPr lang="pl-PL" sz="800" dirty="0"/>
-              <a:t> -m </a:t>
-            </a:r>
-          </a:p>
-          <a:p>
-            <a:pPr lvl="1">
-              <a:buFont typeface="Wingdings" panose="05000000000000000000" pitchFamily="2" charset="2"/>
-              <a:buChar char="§"/>
-            </a:pPr>
-            <a:r>
-              <a:rPr lang="pl-PL" sz="800" dirty="0"/>
-              <a:t>git </a:t>
-            </a:r>
-            <a:r>
-              <a:rPr lang="pl-PL" sz="800" dirty="0" err="1"/>
-              <a:t>commit</a:t>
-            </a:r>
-            <a:r>
-              <a:rPr lang="pl-PL" sz="800" dirty="0"/>
-              <a:t> -</a:t>
-            </a:r>
-            <a:r>
-              <a:rPr lang="pl-PL" sz="800" dirty="0" err="1"/>
-              <a:t>am</a:t>
-            </a:r>
-            <a:r>
-              <a:rPr lang="pl-PL" sz="800" dirty="0"/>
-              <a:t> (wszystkie zmienione pliki; nie nowe)</a:t>
-            </a:r>
-          </a:p>
-          <a:p>
-            <a:pPr lvl="1">
-              <a:buFont typeface="Wingdings" panose="05000000000000000000" pitchFamily="2" charset="2"/>
-              <a:buChar char="§"/>
-            </a:pPr>
-            <a:r>
-              <a:rPr lang="pl-PL" sz="800" dirty="0"/>
-              <a:t>git </a:t>
-            </a:r>
-            <a:r>
-              <a:rPr lang="pl-PL" sz="800" dirty="0" err="1"/>
-              <a:t>push</a:t>
-            </a:r>
-            <a:endParaRPr lang="pl-PL" sz="800" dirty="0"/>
-          </a:p>
-          <a:p>
-            <a:endParaRPr lang="en-US" sz="1200" dirty="0"/>
-          </a:p>
-        </p:txBody>
-      </p:sp>
-    </p:spTree>
-    <p:extLst>
-      <p:ext uri="{BB962C8B-B14F-4D97-AF65-F5344CB8AC3E}">
-        <p14:creationId xmlns:p14="http://schemas.microsoft.com/office/powerpoint/2010/main" val="818339168"/>
-      </p:ext>
-    </p:extLst>
-  </p:cSld>
-  <p:clrMapOvr>
-    <a:masterClrMapping/>
-  </p:clrMapOvr>
-</p:sld>
-</file>
-
-<file path=ppt/slides/slide21.xml><?xml version="1.0" encoding="utf-8"?>
-<p:sld xmlns:a="http://schemas.openxmlformats.org/drawingml/2006/main" xmlns:r="http://schemas.openxmlformats.org/officeDocument/2006/relationships" xmlns:p="http://schemas.openxmlformats.org/presentationml/2006/main">
-  <p:cSld>
-    <p:spTree>
-      <p:nvGrpSpPr>
-        <p:cNvPr id="1" name=""/>
-        <p:cNvGrpSpPr/>
-        <p:nvPr/>
-      </p:nvGrpSpPr>
-      <p:grpSpPr>
-        <a:xfrm>
-          <a:off x="0" y="0"/>
-          <a:ext cx="0" cy="0"/>
-          <a:chOff x="0" y="0"/>
-          <a:chExt cx="0" cy="0"/>
-        </a:xfrm>
-      </p:grpSpPr>
-      <p:sp>
-        <p:nvSpPr>
-          <p:cNvPr id="3" name="Symbol zastępczy zawartości 2"/>
-          <p:cNvSpPr>
-            <a:spLocks noGrp="1"/>
-          </p:cNvSpPr>
-          <p:nvPr>
-            <p:ph idx="1"/>
-          </p:nvPr>
-        </p:nvSpPr>
-        <p:spPr/>
-        <p:txBody>
-          <a:bodyPr>
-            <a:normAutofit/>
-          </a:bodyPr>
-          <a:lstStyle/>
-          <a:p>
-            <a:endParaRPr lang="en-US" sz="1200" dirty="0"/>
+              <a:t>Typowe wykorzystanie</a:t>
+            </a:r>
+            <a:endParaRPr lang="en-US" sz="1800" b="1" dirty="0"/>
           </a:p>
         </p:txBody>
       </p:sp>
@@ -5523,7 +5420,7 @@
 </p:sld>
 </file>
 
-<file path=ppt/slides/slide22.xml><?xml version="1.0" encoding="utf-8"?>
+<file path=ppt/slides/slide21.xml><?xml version="1.0" encoding="utf-8"?>
 <p:sld xmlns:a="http://schemas.openxmlformats.org/drawingml/2006/main" xmlns:r="http://schemas.openxmlformats.org/officeDocument/2006/relationships" xmlns:p="http://schemas.openxmlformats.org/presentationml/2006/main">
   <p:cSld>
     <p:spTree>
@@ -5557,11 +5454,14 @@
           </a:bodyPr>
           <a:lstStyle/>
           <a:p>
-            <a:r>
-              <a:rPr lang="pl-PL" sz="1200" dirty="0" err="1" smtClean="0"/>
+            <a:pPr marL="0" indent="0">
+              <a:buNone/>
+            </a:pPr>
+            <a:r>
+              <a:rPr lang="pl-PL" sz="1800" b="1" dirty="0" err="1" smtClean="0"/>
               <a:t>Workflow</a:t>
             </a:r>
-            <a:endParaRPr lang="en-US" sz="1200" dirty="0"/>
+            <a:endParaRPr lang="en-US" sz="1200" b="1" dirty="0"/>
           </a:p>
         </p:txBody>
       </p:sp>
@@ -5619,6 +5519,349 @@
 </p:sld>
 </file>
 
+<file path=ppt/slides/slide22.xml><?xml version="1.0" encoding="utf-8"?>
+<p:sld xmlns:a="http://schemas.openxmlformats.org/drawingml/2006/main" xmlns:r="http://schemas.openxmlformats.org/officeDocument/2006/relationships" xmlns:p="http://schemas.openxmlformats.org/presentationml/2006/main">
+  <p:cSld>
+    <p:spTree>
+      <p:nvGrpSpPr>
+        <p:cNvPr id="1" name=""/>
+        <p:cNvGrpSpPr/>
+        <p:nvPr/>
+      </p:nvGrpSpPr>
+      <p:grpSpPr>
+        <a:xfrm>
+          <a:off x="0" y="0"/>
+          <a:ext cx="0" cy="0"/>
+          <a:chOff x="0" y="0"/>
+          <a:chExt cx="0" cy="0"/>
+        </a:xfrm>
+      </p:grpSpPr>
+      <p:sp>
+        <p:nvSpPr>
+          <p:cNvPr id="3" name="Symbol zastępczy zawartości 2"/>
+          <p:cNvSpPr>
+            <a:spLocks noGrp="1"/>
+          </p:cNvSpPr>
+          <p:nvPr>
+            <p:ph idx="1"/>
+          </p:nvPr>
+        </p:nvSpPr>
+        <p:spPr/>
+        <p:txBody>
+          <a:bodyPr>
+            <a:normAutofit/>
+          </a:bodyPr>
+          <a:lstStyle/>
+          <a:p>
+            <a:pPr marL="0" indent="0">
+              <a:buNone/>
+            </a:pPr>
+            <a:r>
+              <a:rPr lang="pl-PL" sz="1800" b="1" dirty="0" smtClean="0"/>
+              <a:t>Przykład</a:t>
+            </a:r>
+            <a:endParaRPr lang="pl-PL" sz="1200" b="1" dirty="0" smtClean="0"/>
+          </a:p>
+          <a:p>
+            <a:r>
+              <a:rPr lang="pl-PL" sz="1200" dirty="0" smtClean="0"/>
+              <a:t>Utworzyć katalog </a:t>
+            </a:r>
+            <a:r>
+              <a:rPr lang="pl-PL" sz="1200" dirty="0" err="1" smtClean="0"/>
+              <a:t>GitRepos</a:t>
+            </a:r>
+            <a:r>
+              <a:rPr lang="pl-PL" sz="1200" dirty="0" smtClean="0"/>
+              <a:t>/</a:t>
+            </a:r>
+            <a:r>
+              <a:rPr lang="pl-PL" sz="1200" dirty="0" err="1" smtClean="0"/>
+              <a:t>TestRepo</a:t>
+            </a:r>
+            <a:endParaRPr lang="pl-PL" sz="1200" dirty="0" smtClean="0"/>
+          </a:p>
+          <a:p>
+            <a:r>
+              <a:rPr lang="pl-PL" sz="1200" dirty="0" smtClean="0"/>
+              <a:t>Zainicjalizować repozytorium</a:t>
+            </a:r>
+          </a:p>
+          <a:p>
+            <a:pPr marL="0" indent="0">
+              <a:buNone/>
+            </a:pPr>
+            <a:endParaRPr lang="pl-PL" sz="1200" dirty="0" smtClean="0"/>
+          </a:p>
+          <a:p>
+            <a:pPr marL="0" indent="0">
+              <a:buNone/>
+            </a:pPr>
+            <a:endParaRPr lang="pl-PL" sz="1200" dirty="0"/>
+          </a:p>
+          <a:p>
+            <a:pPr marL="0" indent="0">
+              <a:buNone/>
+            </a:pPr>
+            <a:endParaRPr lang="pl-PL" sz="1200" dirty="0" smtClean="0"/>
+          </a:p>
+          <a:p>
+            <a:r>
+              <a:rPr lang="pl-PL" sz="1200" dirty="0" smtClean="0"/>
+              <a:t>Sprawdzić status</a:t>
+            </a:r>
+          </a:p>
+          <a:p>
+            <a:pPr marL="0" indent="0">
+              <a:buNone/>
+            </a:pPr>
+            <a:endParaRPr lang="pl-PL" sz="1200" dirty="0"/>
+          </a:p>
+          <a:p>
+            <a:pPr marL="0" indent="0">
+              <a:buNone/>
+            </a:pPr>
+            <a:endParaRPr lang="pl-PL" sz="1200" dirty="0" smtClean="0"/>
+          </a:p>
+          <a:p>
+            <a:pPr marL="0" indent="0">
+              <a:buNone/>
+            </a:pPr>
+            <a:endParaRPr lang="pl-PL" sz="1200" dirty="0"/>
+          </a:p>
+          <a:p>
+            <a:r>
+              <a:rPr lang="pl-PL" sz="1200" dirty="0" smtClean="0"/>
+              <a:t>Sprawdzić historię komitów</a:t>
+            </a:r>
+          </a:p>
+          <a:p>
+            <a:pPr marL="0" indent="0">
+              <a:buNone/>
+            </a:pPr>
+            <a:endParaRPr lang="pl-PL" sz="1200" dirty="0" smtClean="0"/>
+          </a:p>
+          <a:p>
+            <a:pPr marL="0" indent="0">
+              <a:buNone/>
+            </a:pPr>
+            <a:endParaRPr lang="pl-PL" sz="1200" dirty="0" smtClean="0"/>
+          </a:p>
+          <a:p>
+            <a:pPr marL="0" indent="0">
+              <a:buNone/>
+            </a:pPr>
+            <a:endParaRPr lang="pl-PL" sz="1200" dirty="0" smtClean="0">
+              <a:latin typeface="Lucida Console" panose="020B0609040504020204" pitchFamily="49" charset="0"/>
+            </a:endParaRPr>
+          </a:p>
+        </p:txBody>
+      </p:sp>
+      <p:pic>
+        <p:nvPicPr>
+          <p:cNvPr id="1037" name="Picture 13"/>
+          <p:cNvPicPr>
+            <a:picLocks noChangeAspect="1" noChangeArrowheads="1"/>
+          </p:cNvPicPr>
+          <p:nvPr/>
+        </p:nvPicPr>
+        <p:blipFill>
+          <a:blip r:embed="rId2">
+            <a:extLst>
+              <a:ext uri="{28A0092B-C50C-407E-A947-70E740481C1C}">
+                <a14:useLocalDpi xmlns:a14="http://schemas.microsoft.com/office/drawing/2010/main" val="0"/>
+              </a:ext>
+            </a:extLst>
+          </a:blip>
+          <a:srcRect/>
+          <a:stretch>
+            <a:fillRect/>
+          </a:stretch>
+        </p:blipFill>
+        <p:spPr bwMode="auto">
+          <a:xfrm>
+            <a:off x="1115616" y="1978596"/>
+            <a:ext cx="3672407" cy="421665"/>
+          </a:xfrm>
+          <a:prstGeom prst="rect">
+            <a:avLst/>
+          </a:prstGeom>
+          <a:noFill/>
+          <a:ln>
+            <a:noFill/>
+          </a:ln>
+          <a:effectLst/>
+          <a:extLst>
+            <a:ext uri="{909E8E84-426E-40DD-AFC4-6F175D3DCCD1}">
+              <a14:hiddenFill xmlns:a14="http://schemas.microsoft.com/office/drawing/2010/main">
+                <a:solidFill>
+                  <a:schemeClr val="accent1"/>
+                </a:solidFill>
+              </a14:hiddenFill>
+            </a:ext>
+            <a:ext uri="{91240B29-F687-4F45-9708-019B960494DF}">
+              <a14:hiddenLine xmlns:a14="http://schemas.microsoft.com/office/drawing/2010/main" w="9525">
+                <a:solidFill>
+                  <a:schemeClr val="tx1"/>
+                </a:solidFill>
+                <a:miter lim="800000"/>
+                <a:headEnd/>
+                <a:tailEnd/>
+              </a14:hiddenLine>
+            </a:ext>
+            <a:ext uri="{AF507438-7753-43E0-B8FC-AC1667EBCBE1}">
+              <a14:hiddenEffects xmlns:a14="http://schemas.microsoft.com/office/drawing/2010/main">
+                <a:effectLst>
+                  <a:outerShdw dist="35921" dir="2700000" algn="ctr" rotWithShape="0">
+                    <a:schemeClr val="bg2"/>
+                  </a:outerShdw>
+                </a:effectLst>
+              </a14:hiddenEffects>
+            </a:ext>
+          </a:extLst>
+        </p:spPr>
+      </p:pic>
+      <p:pic>
+        <p:nvPicPr>
+          <p:cNvPr id="1039" name="Picture 15"/>
+          <p:cNvPicPr>
+            <a:picLocks noChangeAspect="1" noChangeArrowheads="1"/>
+          </p:cNvPicPr>
+          <p:nvPr/>
+        </p:nvPicPr>
+        <p:blipFill>
+          <a:blip r:embed="rId3">
+            <a:extLst>
+              <a:ext uri="{28A0092B-C50C-407E-A947-70E740481C1C}">
+                <a14:useLocalDpi xmlns:a14="http://schemas.microsoft.com/office/drawing/2010/main" val="0"/>
+              </a:ext>
+            </a:extLst>
+          </a:blip>
+          <a:srcRect/>
+          <a:stretch>
+            <a:fillRect/>
+          </a:stretch>
+        </p:blipFill>
+        <p:spPr bwMode="auto">
+          <a:xfrm>
+            <a:off x="1115616" y="2921406"/>
+            <a:ext cx="3741885" cy="483905"/>
+          </a:xfrm>
+          <a:prstGeom prst="rect">
+            <a:avLst/>
+          </a:prstGeom>
+          <a:noFill/>
+          <a:ln>
+            <a:noFill/>
+          </a:ln>
+          <a:effectLst/>
+          <a:extLst>
+            <a:ext uri="{909E8E84-426E-40DD-AFC4-6F175D3DCCD1}">
+              <a14:hiddenFill xmlns:a14="http://schemas.microsoft.com/office/drawing/2010/main">
+                <a:solidFill>
+                  <a:schemeClr val="accent1"/>
+                </a:solidFill>
+              </a14:hiddenFill>
+            </a:ext>
+            <a:ext uri="{91240B29-F687-4F45-9708-019B960494DF}">
+              <a14:hiddenLine xmlns:a14="http://schemas.microsoft.com/office/drawing/2010/main" w="9525">
+                <a:solidFill>
+                  <a:schemeClr val="tx1"/>
+                </a:solidFill>
+                <a:miter lim="800000"/>
+                <a:headEnd/>
+                <a:tailEnd/>
+              </a14:hiddenLine>
+            </a:ext>
+            <a:ext uri="{AF507438-7753-43E0-B8FC-AC1667EBCBE1}">
+              <a14:hiddenEffects xmlns:a14="http://schemas.microsoft.com/office/drawing/2010/main">
+                <a:effectLst>
+                  <a:outerShdw dist="35921" dir="2700000" algn="ctr" rotWithShape="0">
+                    <a:schemeClr val="bg2"/>
+                  </a:outerShdw>
+                </a:effectLst>
+              </a14:hiddenEffects>
+            </a:ext>
+          </a:extLst>
+        </p:spPr>
+      </p:pic>
+      <p:pic>
+        <p:nvPicPr>
+          <p:cNvPr id="1041" name="Picture 17"/>
+          <p:cNvPicPr>
+            <a:picLocks noChangeAspect="1" noChangeArrowheads="1"/>
+          </p:cNvPicPr>
+          <p:nvPr/>
+        </p:nvPicPr>
+        <p:blipFill>
+          <a:blip r:embed="rId4">
+            <a:extLst>
+              <a:ext uri="{28A0092B-C50C-407E-A947-70E740481C1C}">
+                <a14:useLocalDpi xmlns:a14="http://schemas.microsoft.com/office/drawing/2010/main" val="0"/>
+              </a:ext>
+            </a:extLst>
+          </a:blip>
+          <a:srcRect/>
+          <a:stretch>
+            <a:fillRect/>
+          </a:stretch>
+        </p:blipFill>
+        <p:spPr bwMode="auto">
+          <a:xfrm>
+            <a:off x="1115616" y="3838294"/>
+            <a:ext cx="3752850" cy="171450"/>
+          </a:xfrm>
+          <a:prstGeom prst="rect">
+            <a:avLst/>
+          </a:prstGeom>
+          <a:noFill/>
+          <a:ln>
+            <a:noFill/>
+          </a:ln>
+          <a:effectLst/>
+          <a:extLst>
+            <a:ext uri="{909E8E84-426E-40DD-AFC4-6F175D3DCCD1}">
+              <a14:hiddenFill xmlns:a14="http://schemas.microsoft.com/office/drawing/2010/main">
+                <a:solidFill>
+                  <a:schemeClr val="accent1"/>
+                </a:solidFill>
+              </a14:hiddenFill>
+            </a:ext>
+            <a:ext uri="{91240B29-F687-4F45-9708-019B960494DF}">
+              <a14:hiddenLine xmlns:a14="http://schemas.microsoft.com/office/drawing/2010/main" w="9525">
+                <a:solidFill>
+                  <a:schemeClr val="tx1"/>
+                </a:solidFill>
+                <a:miter lim="800000"/>
+                <a:headEnd/>
+                <a:tailEnd/>
+              </a14:hiddenLine>
+            </a:ext>
+            <a:ext uri="{AF507438-7753-43E0-B8FC-AC1667EBCBE1}">
+              <a14:hiddenEffects xmlns:a14="http://schemas.microsoft.com/office/drawing/2010/main">
+                <a:effectLst>
+                  <a:outerShdw dist="35921" dir="2700000" algn="ctr" rotWithShape="0">
+                    <a:schemeClr val="bg2"/>
+                  </a:outerShdw>
+                </a:effectLst>
+              </a14:hiddenEffects>
+            </a:ext>
+          </a:extLst>
+        </p:spPr>
+      </p:pic>
+    </p:spTree>
+    <p:extLst>
+      <p:ext uri="{BB962C8B-B14F-4D97-AF65-F5344CB8AC3E}">
+        <p14:creationId xmlns:p14="http://schemas.microsoft.com/office/powerpoint/2010/main" val="472078103"/>
+      </p:ext>
+    </p:extLst>
+  </p:cSld>
+  <p:clrMapOvr>
+    <a:masterClrMapping/>
+  </p:clrMapOvr>
+</p:sld>
+</file>
+
 <file path=ppt/slides/slide23.xml><?xml version="1.0" encoding="utf-8"?>
 <p:sld xmlns:a="http://schemas.openxmlformats.org/drawingml/2006/main" xmlns:r="http://schemas.openxmlformats.org/officeDocument/2006/relationships" xmlns:p="http://schemas.openxmlformats.org/presentationml/2006/main">
   <p:cSld>
@@ -5653,44 +5896,387 @@
           </a:bodyPr>
           <a:lstStyle/>
           <a:p>
+            <a:r>
+              <a:rPr lang="pl-PL" sz="1200" dirty="0" smtClean="0">
+                <a:latin typeface="Lucida Console" panose="020B0609040504020204" pitchFamily="49" charset="0"/>
+              </a:rPr>
+              <a:t>Utworzyć </a:t>
+            </a:r>
+            <a:r>
+              <a:rPr lang="pl-PL" sz="1200" dirty="0" smtClean="0">
+                <a:latin typeface="Lucida Console" panose="020B0609040504020204" pitchFamily="49" charset="0"/>
+              </a:rPr>
+              <a:t>plik</a:t>
+            </a:r>
+          </a:p>
+          <a:p>
             <a:pPr marL="0" indent="0">
               <a:buNone/>
             </a:pPr>
-            <a:r>
-              <a:rPr lang="pl-PL" sz="1200" dirty="0" smtClean="0"/>
-              <a:t>Linki</a:t>
+            <a:endParaRPr lang="pl-PL" sz="1200" dirty="0" smtClean="0">
+              <a:latin typeface="Lucida Console" panose="020B0609040504020204" pitchFamily="49" charset="0"/>
+            </a:endParaRPr>
+          </a:p>
+          <a:p>
+            <a:r>
+              <a:rPr lang="pl-PL" sz="1200" dirty="0" smtClean="0">
+                <a:latin typeface="Lucida Console" panose="020B0609040504020204" pitchFamily="49" charset="0"/>
+              </a:rPr>
+              <a:t>Sprawdzić status </a:t>
+            </a:r>
+            <a:r>
+              <a:rPr lang="pl-PL" sz="1200" dirty="0" smtClean="0">
+                <a:latin typeface="Lucida Console" panose="020B0609040504020204" pitchFamily="49" charset="0"/>
+              </a:rPr>
+              <a:t>repozytorium</a:t>
             </a:r>
           </a:p>
           <a:p>
             <a:pPr marL="0" indent="0">
               <a:buNone/>
             </a:pPr>
-            <a:r>
-              <a:rPr lang="en-US" sz="1200" dirty="0">
-                <a:hlinkClick r:id="rId2"/>
+            <a:endParaRPr lang="pl-PL" sz="1200" dirty="0">
+              <a:latin typeface="Lucida Console" panose="020B0609040504020204" pitchFamily="49" charset="0"/>
+            </a:endParaRPr>
+          </a:p>
+          <a:p>
+            <a:pPr marL="0" indent="0">
+              <a:buNone/>
+            </a:pPr>
+            <a:endParaRPr lang="pl-PL" sz="1200" dirty="0" smtClean="0">
+              <a:latin typeface="Lucida Console" panose="020B0609040504020204" pitchFamily="49" charset="0"/>
+            </a:endParaRPr>
+          </a:p>
+          <a:p>
+            <a:pPr marL="0" indent="0">
+              <a:buNone/>
+            </a:pPr>
+            <a:endParaRPr lang="pl-PL" sz="1200" dirty="0">
+              <a:latin typeface="Lucida Console" panose="020B0609040504020204" pitchFamily="49" charset="0"/>
+            </a:endParaRPr>
+          </a:p>
+          <a:p>
+            <a:pPr marL="0" indent="0">
+              <a:buNone/>
+            </a:pPr>
+            <a:endParaRPr lang="pl-PL" sz="1200" dirty="0">
+              <a:latin typeface="Lucida Console" panose="020B0609040504020204" pitchFamily="49" charset="0"/>
+            </a:endParaRPr>
+          </a:p>
+          <a:p>
+            <a:pPr marL="0" indent="0">
+              <a:buNone/>
+            </a:pPr>
+            <a:endParaRPr lang="pl-PL" sz="1200" dirty="0">
+              <a:latin typeface="Lucida Console" panose="020B0609040504020204" pitchFamily="49" charset="0"/>
+            </a:endParaRPr>
+          </a:p>
+          <a:p>
+            <a:r>
+              <a:rPr lang="pl-PL" sz="1200" dirty="0" smtClean="0">
+                <a:latin typeface="Lucida Console" panose="020B0609040504020204" pitchFamily="49" charset="0"/>
               </a:rPr>
-              <a:t>https://it-consulting.pl/autoinstalator/wordpress/2011/03/22/co-wybrac-czyli-cykl-zycia-projektu-tworzenia-oprogramowania/#.</a:t>
-            </a:r>
-            <a:r>
-              <a:rPr lang="en-US" sz="1200" dirty="0" smtClean="0">
-                <a:hlinkClick r:id="rId2"/>
+              <a:t>Dodać plik na </a:t>
+            </a:r>
+            <a:r>
+              <a:rPr lang="pl-PL" sz="1200" dirty="0" smtClean="0">
+                <a:latin typeface="Lucida Console" panose="020B0609040504020204" pitchFamily="49" charset="0"/>
               </a:rPr>
-              <a:t>YES3VRLdiUk</a:t>
-            </a:r>
-            <a:endParaRPr lang="pl-PL" sz="1200" dirty="0" smtClean="0"/>
+              <a:t>stage</a:t>
+            </a:r>
           </a:p>
           <a:p>
             <a:pPr marL="0" indent="0">
               <a:buNone/>
             </a:pPr>
-            <a:endParaRPr lang="en-US" sz="1200" dirty="0"/>
-          </a:p>
-        </p:txBody>
-      </p:sp>
+            <a:endParaRPr lang="pl-PL" sz="1200" dirty="0" smtClean="0">
+              <a:latin typeface="Lucida Console" panose="020B0609040504020204" pitchFamily="49" charset="0"/>
+            </a:endParaRPr>
+          </a:p>
+          <a:p>
+            <a:r>
+              <a:rPr lang="pl-PL" sz="1200" dirty="0" smtClean="0">
+                <a:latin typeface="Lucida Console" panose="020B0609040504020204" pitchFamily="49" charset="0"/>
+              </a:rPr>
+              <a:t>Ponownie </a:t>
+            </a:r>
+            <a:r>
+              <a:rPr lang="pl-PL" sz="1200" dirty="0" smtClean="0">
+                <a:latin typeface="Lucida Console" panose="020B0609040504020204" pitchFamily="49" charset="0"/>
+              </a:rPr>
+              <a:t>sprawdzić status</a:t>
+            </a:r>
+          </a:p>
+          <a:p>
+            <a:pPr marL="0" indent="0">
+              <a:buNone/>
+            </a:pPr>
+            <a:endParaRPr lang="pl-PL" sz="1200" dirty="0" smtClean="0">
+              <a:latin typeface="Lucida Console" panose="020B0609040504020204" pitchFamily="49" charset="0"/>
+            </a:endParaRPr>
+          </a:p>
+        </p:txBody>
+      </p:sp>
+      <p:pic>
+        <p:nvPicPr>
+          <p:cNvPr id="1045" name="Picture 21"/>
+          <p:cNvPicPr>
+            <a:picLocks noChangeAspect="1" noChangeArrowheads="1"/>
+          </p:cNvPicPr>
+          <p:nvPr/>
+        </p:nvPicPr>
+        <p:blipFill>
+          <a:blip r:embed="rId2">
+            <a:extLst>
+              <a:ext uri="{28A0092B-C50C-407E-A947-70E740481C1C}">
+                <a14:useLocalDpi xmlns:a14="http://schemas.microsoft.com/office/drawing/2010/main" val="0"/>
+              </a:ext>
+            </a:extLst>
+          </a:blip>
+          <a:srcRect/>
+          <a:stretch>
+            <a:fillRect/>
+          </a:stretch>
+        </p:blipFill>
+        <p:spPr bwMode="auto">
+          <a:xfrm>
+            <a:off x="916522" y="1516013"/>
+            <a:ext cx="2843213" cy="95250"/>
+          </a:xfrm>
+          <a:prstGeom prst="rect">
+            <a:avLst/>
+          </a:prstGeom>
+          <a:noFill/>
+          <a:ln>
+            <a:noFill/>
+          </a:ln>
+          <a:effectLst/>
+          <a:extLst>
+            <a:ext uri="{909E8E84-426E-40DD-AFC4-6F175D3DCCD1}">
+              <a14:hiddenFill xmlns:a14="http://schemas.microsoft.com/office/drawing/2010/main">
+                <a:solidFill>
+                  <a:schemeClr val="accent1"/>
+                </a:solidFill>
+              </a14:hiddenFill>
+            </a:ext>
+            <a:ext uri="{91240B29-F687-4F45-9708-019B960494DF}">
+              <a14:hiddenLine xmlns:a14="http://schemas.microsoft.com/office/drawing/2010/main" w="9525">
+                <a:solidFill>
+                  <a:schemeClr val="tx1"/>
+                </a:solidFill>
+                <a:miter lim="800000"/>
+                <a:headEnd/>
+                <a:tailEnd/>
+              </a14:hiddenLine>
+            </a:ext>
+            <a:ext uri="{AF507438-7753-43E0-B8FC-AC1667EBCBE1}">
+              <a14:hiddenEffects xmlns:a14="http://schemas.microsoft.com/office/drawing/2010/main">
+                <a:effectLst>
+                  <a:outerShdw dist="35921" dir="2700000" algn="ctr" rotWithShape="0">
+                    <a:schemeClr val="bg2"/>
+                  </a:outerShdw>
+                </a:effectLst>
+              </a14:hiddenEffects>
+            </a:ext>
+          </a:extLst>
+        </p:spPr>
+      </p:pic>
+      <p:pic>
+        <p:nvPicPr>
+          <p:cNvPr id="2053" name="Picture 5"/>
+          <p:cNvPicPr>
+            <a:picLocks noChangeAspect="1" noChangeArrowheads="1"/>
+          </p:cNvPicPr>
+          <p:nvPr/>
+        </p:nvPicPr>
+        <p:blipFill>
+          <a:blip r:embed="rId3">
+            <a:extLst>
+              <a:ext uri="{28A0092B-C50C-407E-A947-70E740481C1C}">
+                <a14:useLocalDpi xmlns:a14="http://schemas.microsoft.com/office/drawing/2010/main" val="0"/>
+              </a:ext>
+            </a:extLst>
+          </a:blip>
+          <a:srcRect/>
+          <a:stretch>
+            <a:fillRect/>
+          </a:stretch>
+        </p:blipFill>
+        <p:spPr bwMode="auto">
+          <a:xfrm>
+            <a:off x="916522" y="1923678"/>
+            <a:ext cx="4386949" cy="864096"/>
+          </a:xfrm>
+          <a:prstGeom prst="rect">
+            <a:avLst/>
+          </a:prstGeom>
+          <a:noFill/>
+          <a:ln>
+            <a:noFill/>
+          </a:ln>
+          <a:effectLst/>
+          <a:extLst>
+            <a:ext uri="{909E8E84-426E-40DD-AFC4-6F175D3DCCD1}">
+              <a14:hiddenFill xmlns:a14="http://schemas.microsoft.com/office/drawing/2010/main">
+                <a:solidFill>
+                  <a:schemeClr val="accent1"/>
+                </a:solidFill>
+              </a14:hiddenFill>
+            </a:ext>
+            <a:ext uri="{91240B29-F687-4F45-9708-019B960494DF}">
+              <a14:hiddenLine xmlns:a14="http://schemas.microsoft.com/office/drawing/2010/main" w="9525">
+                <a:solidFill>
+                  <a:schemeClr val="tx1"/>
+                </a:solidFill>
+                <a:miter lim="800000"/>
+                <a:headEnd/>
+                <a:tailEnd/>
+              </a14:hiddenLine>
+            </a:ext>
+            <a:ext uri="{AF507438-7753-43E0-B8FC-AC1667EBCBE1}">
+              <a14:hiddenEffects xmlns:a14="http://schemas.microsoft.com/office/drawing/2010/main">
+                <a:effectLst>
+                  <a:outerShdw dist="35921" dir="2700000" algn="ctr" rotWithShape="0">
+                    <a:schemeClr val="bg2"/>
+                  </a:outerShdw>
+                </a:effectLst>
+              </a14:hiddenEffects>
+            </a:ext>
+          </a:extLst>
+        </p:spPr>
+      </p:pic>
+      <p:pic>
+        <p:nvPicPr>
+          <p:cNvPr id="2057" name="Picture 9"/>
+          <p:cNvPicPr>
+            <a:picLocks noChangeAspect="1" noChangeArrowheads="1"/>
+          </p:cNvPicPr>
+          <p:nvPr/>
+        </p:nvPicPr>
+        <p:blipFill>
+          <a:blip r:embed="rId4">
+            <a:extLst>
+              <a:ext uri="{28A0092B-C50C-407E-A947-70E740481C1C}">
+                <a14:useLocalDpi xmlns:a14="http://schemas.microsoft.com/office/drawing/2010/main" val="0"/>
+              </a:ext>
+            </a:extLst>
+          </a:blip>
+          <a:srcRect/>
+          <a:stretch>
+            <a:fillRect/>
+          </a:stretch>
+        </p:blipFill>
+        <p:spPr bwMode="auto">
+          <a:xfrm>
+            <a:off x="916522" y="3271391"/>
+            <a:ext cx="1338833" cy="105697"/>
+          </a:xfrm>
+          <a:prstGeom prst="rect">
+            <a:avLst/>
+          </a:prstGeom>
+          <a:noFill/>
+          <a:ln>
+            <a:noFill/>
+          </a:ln>
+          <a:effectLst/>
+          <a:extLst>
+            <a:ext uri="{909E8E84-426E-40DD-AFC4-6F175D3DCCD1}">
+              <a14:hiddenFill xmlns:a14="http://schemas.microsoft.com/office/drawing/2010/main">
+                <a:solidFill>
+                  <a:schemeClr val="accent1"/>
+                </a:solidFill>
+              </a14:hiddenFill>
+            </a:ext>
+            <a:ext uri="{91240B29-F687-4F45-9708-019B960494DF}">
+              <a14:hiddenLine xmlns:a14="http://schemas.microsoft.com/office/drawing/2010/main" w="9525">
+                <a:solidFill>
+                  <a:schemeClr val="tx1"/>
+                </a:solidFill>
+                <a:miter lim="800000"/>
+                <a:headEnd/>
+                <a:tailEnd/>
+              </a14:hiddenLine>
+            </a:ext>
+            <a:ext uri="{AF507438-7753-43E0-B8FC-AC1667EBCBE1}">
+              <a14:hiddenEffects xmlns:a14="http://schemas.microsoft.com/office/drawing/2010/main">
+                <a:effectLst>
+                  <a:outerShdw dist="35921" dir="2700000" algn="ctr" rotWithShape="0">
+                    <a:schemeClr val="bg2"/>
+                  </a:outerShdw>
+                </a:effectLst>
+              </a14:hiddenEffects>
+            </a:ext>
+          </a:extLst>
+        </p:spPr>
+      </p:pic>
+      <p:pic>
+        <p:nvPicPr>
+          <p:cNvPr id="2059" name="Picture 11"/>
+          <p:cNvPicPr>
+            <a:picLocks noChangeAspect="1" noChangeArrowheads="1"/>
+          </p:cNvPicPr>
+          <p:nvPr/>
+        </p:nvPicPr>
+        <p:blipFill>
+          <a:blip r:embed="rId5">
+            <a:extLst>
+              <a:ext uri="{28A0092B-C50C-407E-A947-70E740481C1C}">
+                <a14:useLocalDpi xmlns:a14="http://schemas.microsoft.com/office/drawing/2010/main" val="0"/>
+              </a:ext>
+            </a:extLst>
+          </a:blip>
+          <a:srcRect/>
+          <a:stretch>
+            <a:fillRect/>
+          </a:stretch>
+        </p:blipFill>
+        <p:spPr bwMode="auto">
+          <a:xfrm>
+            <a:off x="916522" y="3723878"/>
+            <a:ext cx="2967946" cy="792088"/>
+          </a:xfrm>
+          <a:prstGeom prst="rect">
+            <a:avLst/>
+          </a:prstGeom>
+          <a:noFill/>
+          <a:ln>
+            <a:noFill/>
+          </a:ln>
+          <a:effectLst/>
+          <a:extLst>
+            <a:ext uri="{909E8E84-426E-40DD-AFC4-6F175D3DCCD1}">
+              <a14:hiddenFill xmlns:a14="http://schemas.microsoft.com/office/drawing/2010/main">
+                <a:solidFill>
+                  <a:schemeClr val="accent1"/>
+                </a:solidFill>
+              </a14:hiddenFill>
+            </a:ext>
+            <a:ext uri="{91240B29-F687-4F45-9708-019B960494DF}">
+              <a14:hiddenLine xmlns:a14="http://schemas.microsoft.com/office/drawing/2010/main" w="9525">
+                <a:solidFill>
+                  <a:schemeClr val="tx1"/>
+                </a:solidFill>
+                <a:miter lim="800000"/>
+                <a:headEnd/>
+                <a:tailEnd/>
+              </a14:hiddenLine>
+            </a:ext>
+            <a:ext uri="{AF507438-7753-43E0-B8FC-AC1667EBCBE1}">
+              <a14:hiddenEffects xmlns:a14="http://schemas.microsoft.com/office/drawing/2010/main">
+                <a:effectLst>
+                  <a:outerShdw dist="35921" dir="2700000" algn="ctr" rotWithShape="0">
+                    <a:schemeClr val="bg2"/>
+                  </a:outerShdw>
+                </a:effectLst>
+              </a14:hiddenEffects>
+            </a:ext>
+          </a:extLst>
+        </p:spPr>
+      </p:pic>
     </p:spTree>
     <p:extLst>
       <p:ext uri="{BB962C8B-B14F-4D97-AF65-F5344CB8AC3E}">
-        <p14:creationId xmlns:p14="http://schemas.microsoft.com/office/powerpoint/2010/main" val="1449403051"/>
+        <p14:creationId xmlns:p14="http://schemas.microsoft.com/office/powerpoint/2010/main" val="731892952"/>
       </p:ext>
     </p:extLst>
   </p:cSld>
@@ -5703,20 +6289,6 @@
 <file path=ppt/slides/slide24.xml><?xml version="1.0" encoding="utf-8"?>
 <p:sld xmlns:a="http://schemas.openxmlformats.org/drawingml/2006/main" xmlns:r="http://schemas.openxmlformats.org/officeDocument/2006/relationships" xmlns:p="http://schemas.openxmlformats.org/presentationml/2006/main">
   <p:cSld>
-    <p:bg>
-      <p:bgPr>
-        <a:blipFill dpi="0" rotWithShape="1">
-          <a:blip r:embed="rId2">
-            <a:lum/>
-          </a:blip>
-          <a:srcRect/>
-          <a:stretch>
-            <a:fillRect/>
-          </a:stretch>
-        </a:blipFill>
-        <a:effectLst/>
-      </p:bgPr>
-    </p:bg>
     <p:spTree>
       <p:nvGrpSpPr>
         <p:cNvPr id="1" name=""/>
@@ -5733,221 +6305,1088 @@
       </p:grpSpPr>
       <p:sp>
         <p:nvSpPr>
-          <p:cNvPr id="4" name="pole tekstowe 3"/>
-          <p:cNvSpPr txBox="1"/>
+          <p:cNvPr id="3" name="Symbol zastępczy zawartości 2"/>
+          <p:cNvSpPr>
+            <a:spLocks noGrp="1"/>
+          </p:cNvSpPr>
+          <p:nvPr>
+            <p:ph idx="1"/>
+          </p:nvPr>
+        </p:nvSpPr>
+        <p:spPr/>
+        <p:txBody>
+          <a:bodyPr>
+            <a:normAutofit/>
+          </a:bodyPr>
+          <a:lstStyle/>
+          <a:p>
+            <a:r>
+              <a:rPr lang="pl-PL" sz="1200" dirty="0" smtClean="0">
+                <a:latin typeface="Lucida Console" panose="020B0609040504020204" pitchFamily="49" charset="0"/>
+              </a:rPr>
+              <a:t>Wykonać </a:t>
+            </a:r>
+            <a:r>
+              <a:rPr lang="pl-PL" sz="1200" dirty="0" err="1" smtClean="0">
+                <a:latin typeface="Lucida Console" panose="020B0609040504020204" pitchFamily="49" charset="0"/>
+              </a:rPr>
+              <a:t>commit</a:t>
+            </a:r>
+            <a:r>
+              <a:rPr lang="pl-PL" sz="1200" dirty="0" smtClean="0">
+                <a:latin typeface="Lucida Console" panose="020B0609040504020204" pitchFamily="49" charset="0"/>
+              </a:rPr>
+              <a:t>, czyli</a:t>
+            </a:r>
+          </a:p>
+          <a:p>
+            <a:pPr marL="0" indent="0">
+              <a:buNone/>
+            </a:pPr>
+            <a:endParaRPr lang="pl-PL" sz="1200" dirty="0" smtClean="0">
+              <a:latin typeface="Lucida Console" panose="020B0609040504020204" pitchFamily="49" charset="0"/>
+            </a:endParaRPr>
+          </a:p>
+          <a:p>
+            <a:pPr marL="0" indent="0">
+              <a:buNone/>
+            </a:pPr>
+            <a:endParaRPr lang="pl-PL" sz="1200" dirty="0">
+              <a:latin typeface="Lucida Console" panose="020B0609040504020204" pitchFamily="49" charset="0"/>
+            </a:endParaRPr>
+          </a:p>
+          <a:p>
+            <a:pPr marL="0" indent="0">
+              <a:buNone/>
+            </a:pPr>
+            <a:endParaRPr lang="pl-PL" sz="1200" dirty="0" smtClean="0">
+              <a:latin typeface="Lucida Console" panose="020B0609040504020204" pitchFamily="49" charset="0"/>
+            </a:endParaRPr>
+          </a:p>
+          <a:p>
+            <a:r>
+              <a:rPr lang="pl-PL" sz="1200" dirty="0" smtClean="0">
+                <a:latin typeface="Lucida Console" panose="020B0609040504020204" pitchFamily="49" charset="0"/>
+              </a:rPr>
+              <a:t>Ponownie </a:t>
+            </a:r>
+            <a:r>
+              <a:rPr lang="pl-PL" sz="1200" dirty="0" smtClean="0">
+                <a:latin typeface="Lucida Console" panose="020B0609040504020204" pitchFamily="49" charset="0"/>
+              </a:rPr>
+              <a:t>sprawdzić status</a:t>
+            </a:r>
+          </a:p>
+          <a:p>
+            <a:pPr marL="0" indent="0">
+              <a:buNone/>
+            </a:pPr>
+            <a:endParaRPr lang="pl-PL" sz="1200" dirty="0">
+              <a:latin typeface="Lucida Console" panose="020B0609040504020204" pitchFamily="49" charset="0"/>
+            </a:endParaRPr>
+          </a:p>
+          <a:p>
+            <a:pPr marL="0" indent="0">
+              <a:buNone/>
+            </a:pPr>
+            <a:endParaRPr lang="pl-PL" sz="1200" dirty="0" smtClean="0">
+              <a:latin typeface="Lucida Console" panose="020B0609040504020204" pitchFamily="49" charset="0"/>
+            </a:endParaRPr>
+          </a:p>
+          <a:p>
+            <a:r>
+              <a:rPr lang="pl-PL" sz="1200" dirty="0" smtClean="0">
+                <a:latin typeface="Lucida Console" panose="020B0609040504020204" pitchFamily="49" charset="0"/>
+              </a:rPr>
+              <a:t>Sprawdzić </a:t>
+            </a:r>
+            <a:r>
+              <a:rPr lang="pl-PL" sz="1200" dirty="0" smtClean="0">
+                <a:latin typeface="Lucida Console" panose="020B0609040504020204" pitchFamily="49" charset="0"/>
+              </a:rPr>
+              <a:t>log</a:t>
+            </a:r>
+          </a:p>
+          <a:p>
+            <a:pPr marL="0" indent="0">
+              <a:buNone/>
+            </a:pPr>
+            <a:endParaRPr lang="pl-PL" sz="1200" dirty="0" smtClean="0">
+              <a:latin typeface="Lucida Console" panose="020B0609040504020204" pitchFamily="49" charset="0"/>
+            </a:endParaRPr>
+          </a:p>
+          <a:p>
+            <a:pPr marL="0" indent="0">
+              <a:buNone/>
+            </a:pPr>
+            <a:endParaRPr lang="pl-PL" sz="1200" dirty="0">
+              <a:latin typeface="Lucida Console" panose="020B0609040504020204" pitchFamily="49" charset="0"/>
+            </a:endParaRPr>
+          </a:p>
+          <a:p>
+            <a:pPr marL="0" indent="0">
+              <a:buNone/>
+            </a:pPr>
+            <a:endParaRPr lang="pl-PL" sz="1200" dirty="0" smtClean="0">
+              <a:latin typeface="Lucida Console" panose="020B0609040504020204" pitchFamily="49" charset="0"/>
+            </a:endParaRPr>
+          </a:p>
+          <a:p>
+            <a:r>
+              <a:rPr lang="pl-PL" sz="1200" dirty="0" smtClean="0">
+                <a:latin typeface="Lucida Console" panose="020B0609040504020204" pitchFamily="49" charset="0"/>
+              </a:rPr>
+              <a:t>Lub w wersji skróconej</a:t>
+            </a:r>
+          </a:p>
+          <a:p>
+            <a:pPr marL="0" indent="0">
+              <a:buNone/>
+            </a:pPr>
+            <a:endParaRPr lang="pl-PL" sz="1200" dirty="0" smtClean="0">
+              <a:latin typeface="Lucida Console" panose="020B0609040504020204" pitchFamily="49" charset="0"/>
+            </a:endParaRPr>
+          </a:p>
+          <a:p>
+            <a:pPr marL="0" indent="0">
+              <a:buNone/>
+            </a:pPr>
+            <a:endParaRPr lang="pl-PL" sz="1200" dirty="0" smtClean="0">
+              <a:latin typeface="Lucida Console" panose="020B0609040504020204" pitchFamily="49" charset="0"/>
+            </a:endParaRPr>
+          </a:p>
+        </p:txBody>
+      </p:sp>
+      <p:pic>
+        <p:nvPicPr>
+          <p:cNvPr id="2056" name="Picture 8"/>
+          <p:cNvPicPr>
+            <a:picLocks noChangeAspect="1" noChangeArrowheads="1"/>
+          </p:cNvPicPr>
           <p:nvPr/>
-        </p:nvSpPr>
-        <p:spPr>
+        </p:nvPicPr>
+        <p:blipFill>
+          <a:blip r:embed="rId2">
+            <a:extLst>
+              <a:ext uri="{28A0092B-C50C-407E-A947-70E740481C1C}">
+                <a14:useLocalDpi xmlns:a14="http://schemas.microsoft.com/office/drawing/2010/main" val="0"/>
+              </a:ext>
+            </a:extLst>
+          </a:blip>
+          <a:srcRect/>
+          <a:stretch>
+            <a:fillRect/>
+          </a:stretch>
+        </p:blipFill>
+        <p:spPr bwMode="auto">
           <a:xfrm>
-            <a:off x="467544" y="4011910"/>
-            <a:ext cx="2592288" cy="784830"/>
+            <a:off x="899592" y="1491630"/>
+            <a:ext cx="3514180" cy="379767"/>
           </a:xfrm>
           <a:prstGeom prst="rect">
             <a:avLst/>
           </a:prstGeom>
           <a:noFill/>
+          <a:ln>
+            <a:noFill/>
+          </a:ln>
+          <a:effectLst/>
+          <a:extLst>
+            <a:ext uri="{909E8E84-426E-40DD-AFC4-6F175D3DCCD1}">
+              <a14:hiddenFill xmlns:a14="http://schemas.microsoft.com/office/drawing/2010/main">
+                <a:solidFill>
+                  <a:schemeClr val="accent1"/>
+                </a:solidFill>
+              </a14:hiddenFill>
+            </a:ext>
+            <a:ext uri="{91240B29-F687-4F45-9708-019B960494DF}">
+              <a14:hiddenLine xmlns:a14="http://schemas.microsoft.com/office/drawing/2010/main" w="9525">
+                <a:solidFill>
+                  <a:schemeClr val="tx1"/>
+                </a:solidFill>
+                <a:miter lim="800000"/>
+                <a:headEnd/>
+                <a:tailEnd/>
+              </a14:hiddenLine>
+            </a:ext>
+            <a:ext uri="{AF507438-7753-43E0-B8FC-AC1667EBCBE1}">
+              <a14:hiddenEffects xmlns:a14="http://schemas.microsoft.com/office/drawing/2010/main">
+                <a:effectLst>
+                  <a:outerShdw dist="35921" dir="2700000" algn="ctr" rotWithShape="0">
+                    <a:schemeClr val="bg2"/>
+                  </a:outerShdw>
+                </a:effectLst>
+              </a14:hiddenEffects>
+            </a:ext>
+          </a:extLst>
         </p:spPr>
-        <p:txBody>
-          <a:bodyPr wrap="square" rtlCol="0">
-            <a:spAutoFit/>
-          </a:bodyPr>
-          <a:lstStyle/>
-          <a:p>
-            <a:endParaRPr lang="pl-PL" sz="900" dirty="0" smtClean="0">
-              <a:latin typeface="Verdana" panose="020B0604030504040204" pitchFamily="34" charset="0"/>
-              <a:ea typeface="Verdana" panose="020B0604030504040204" pitchFamily="34" charset="0"/>
-            </a:endParaRPr>
-          </a:p>
-          <a:p>
-            <a:endParaRPr lang="pl-PL" sz="900" dirty="0">
-              <a:latin typeface="Verdana" panose="020B0604030504040204" pitchFamily="34" charset="0"/>
-              <a:ea typeface="Verdana" panose="020B0604030504040204" pitchFamily="34" charset="0"/>
-            </a:endParaRPr>
-          </a:p>
-          <a:p>
-            <a:r>
-              <a:rPr lang="pl-PL" sz="900" dirty="0" smtClean="0">
-                <a:latin typeface="Verdana" panose="020B0604030504040204" pitchFamily="34" charset="0"/>
-                <a:ea typeface="Verdana" panose="020B0604030504040204" pitchFamily="34" charset="0"/>
-              </a:rPr>
-              <a:t>ZAKŁADY MECHANICZNE „TARNÓW” S.A.</a:t>
-            </a:r>
-          </a:p>
-          <a:p>
-            <a:r>
-              <a:rPr lang="pl-PL" sz="900" dirty="0" smtClean="0">
-                <a:latin typeface="Verdana" panose="020B0604030504040204" pitchFamily="34" charset="0"/>
-                <a:ea typeface="Verdana" panose="020B0604030504040204" pitchFamily="34" charset="0"/>
-              </a:rPr>
-              <a:t>UL. KOCHANOWSKIEGO 30</a:t>
-            </a:r>
-          </a:p>
-          <a:p>
-            <a:r>
-              <a:rPr lang="pl-PL" sz="900" dirty="0" smtClean="0">
-                <a:latin typeface="Verdana" panose="020B0604030504040204" pitchFamily="34" charset="0"/>
-                <a:ea typeface="Verdana" panose="020B0604030504040204" pitchFamily="34" charset="0"/>
-              </a:rPr>
-              <a:t>33-100 TARNÓW</a:t>
-            </a:r>
-            <a:endParaRPr lang="en-US" sz="900" dirty="0">
-              <a:latin typeface="Verdana" panose="020B0604030504040204" pitchFamily="34" charset="0"/>
-              <a:ea typeface="Verdana" panose="020B0604030504040204" pitchFamily="34" charset="0"/>
-            </a:endParaRPr>
-          </a:p>
-        </p:txBody>
-      </p:sp>
-      <p:sp>
-        <p:nvSpPr>
-          <p:cNvPr id="5" name="pole tekstowe 4"/>
-          <p:cNvSpPr txBox="1"/>
+      </p:pic>
+      <p:pic>
+        <p:nvPicPr>
+          <p:cNvPr id="3076" name="Picture 4"/>
+          <p:cNvPicPr>
+            <a:picLocks noChangeAspect="1" noChangeArrowheads="1"/>
+          </p:cNvPicPr>
           <p:nvPr/>
-        </p:nvSpPr>
-        <p:spPr>
+        </p:nvPicPr>
+        <p:blipFill>
+          <a:blip r:embed="rId3">
+            <a:extLst>
+              <a:ext uri="{28A0092B-C50C-407E-A947-70E740481C1C}">
+                <a14:useLocalDpi xmlns:a14="http://schemas.microsoft.com/office/drawing/2010/main" val="0"/>
+              </a:ext>
+            </a:extLst>
+          </a:blip>
+          <a:srcRect/>
+          <a:stretch>
+            <a:fillRect/>
+          </a:stretch>
+        </p:blipFill>
+        <p:spPr bwMode="auto">
           <a:xfrm>
-            <a:off x="3059832" y="4011910"/>
-            <a:ext cx="2592288" cy="923330"/>
+            <a:off x="899591" y="2355726"/>
+            <a:ext cx="2578075" cy="311411"/>
           </a:xfrm>
           <a:prstGeom prst="rect">
             <a:avLst/>
           </a:prstGeom>
           <a:noFill/>
+          <a:ln>
+            <a:noFill/>
+          </a:ln>
+          <a:effectLst/>
+          <a:extLst>
+            <a:ext uri="{909E8E84-426E-40DD-AFC4-6F175D3DCCD1}">
+              <a14:hiddenFill xmlns:a14="http://schemas.microsoft.com/office/drawing/2010/main">
+                <a:solidFill>
+                  <a:schemeClr val="accent1"/>
+                </a:solidFill>
+              </a14:hiddenFill>
+            </a:ext>
+            <a:ext uri="{91240B29-F687-4F45-9708-019B960494DF}">
+              <a14:hiddenLine xmlns:a14="http://schemas.microsoft.com/office/drawing/2010/main" w="9525">
+                <a:solidFill>
+                  <a:schemeClr val="tx1"/>
+                </a:solidFill>
+                <a:miter lim="800000"/>
+                <a:headEnd/>
+                <a:tailEnd/>
+              </a14:hiddenLine>
+            </a:ext>
+            <a:ext uri="{AF507438-7753-43E0-B8FC-AC1667EBCBE1}">
+              <a14:hiddenEffects xmlns:a14="http://schemas.microsoft.com/office/drawing/2010/main">
+                <a:effectLst>
+                  <a:outerShdw dist="35921" dir="2700000" algn="ctr" rotWithShape="0">
+                    <a:schemeClr val="bg2"/>
+                  </a:outerShdw>
+                </a:effectLst>
+              </a14:hiddenEffects>
+            </a:ext>
+          </a:extLst>
         </p:spPr>
-        <p:txBody>
-          <a:bodyPr wrap="square" rtlCol="0">
-            <a:spAutoFit/>
-          </a:bodyPr>
-          <a:lstStyle/>
-          <a:p>
-            <a:endParaRPr lang="pl-PL" sz="900" dirty="0" smtClean="0">
-              <a:latin typeface="Verdana" panose="020B0604030504040204" pitchFamily="34" charset="0"/>
-              <a:ea typeface="Verdana" panose="020B0604030504040204" pitchFamily="34" charset="0"/>
-            </a:endParaRPr>
-          </a:p>
-          <a:p>
-            <a:endParaRPr lang="pl-PL" sz="900" dirty="0">
-              <a:latin typeface="Verdana" panose="020B0604030504040204" pitchFamily="34" charset="0"/>
-              <a:ea typeface="Verdana" panose="020B0604030504040204" pitchFamily="34" charset="0"/>
-            </a:endParaRPr>
-          </a:p>
-          <a:p>
-            <a:r>
-              <a:rPr lang="pl-PL" sz="900" dirty="0" smtClean="0">
-                <a:latin typeface="Verdana" panose="020B0604030504040204" pitchFamily="34" charset="0"/>
-                <a:ea typeface="Verdana" panose="020B0604030504040204" pitchFamily="34" charset="0"/>
-              </a:rPr>
-              <a:t>TEL. (+48) 14 630 62 00</a:t>
-            </a:r>
-          </a:p>
-          <a:p>
-            <a:r>
-              <a:rPr lang="pl-PL" sz="900" dirty="0" smtClean="0">
-                <a:latin typeface="Verdana" panose="020B0604030504040204" pitchFamily="34" charset="0"/>
-                <a:ea typeface="Verdana" panose="020B0604030504040204" pitchFamily="34" charset="0"/>
-              </a:rPr>
-              <a:t>FAKS (+48) 14 630 62 04</a:t>
-            </a:r>
-          </a:p>
-          <a:p>
-            <a:r>
-              <a:rPr lang="pl-PL" sz="900" dirty="0" smtClean="0">
-                <a:latin typeface="Verdana" panose="020B0604030504040204" pitchFamily="34" charset="0"/>
-                <a:ea typeface="Verdana" panose="020B0604030504040204" pitchFamily="34" charset="0"/>
-              </a:rPr>
-              <a:t>ZMT@ZMT.TARNOW.PL</a:t>
-            </a:r>
-          </a:p>
-          <a:p>
-            <a:r>
-              <a:rPr lang="pl-PL" sz="900" dirty="0" smtClean="0">
-                <a:latin typeface="Verdana" panose="020B0604030504040204" pitchFamily="34" charset="0"/>
-                <a:ea typeface="Verdana" panose="020B0604030504040204" pitchFamily="34" charset="0"/>
-              </a:rPr>
-              <a:t>WWW.ZMT.TARNOW.PL</a:t>
-            </a:r>
-            <a:endParaRPr lang="en-US" sz="900" dirty="0">
-              <a:latin typeface="Verdana" panose="020B0604030504040204" pitchFamily="34" charset="0"/>
-              <a:ea typeface="Verdana" panose="020B0604030504040204" pitchFamily="34" charset="0"/>
-            </a:endParaRPr>
-          </a:p>
-        </p:txBody>
-      </p:sp>
-      <p:sp>
-        <p:nvSpPr>
-          <p:cNvPr id="6" name="pole tekstowe 5"/>
-          <p:cNvSpPr txBox="1"/>
+      </p:pic>
+      <p:pic>
+        <p:nvPicPr>
+          <p:cNvPr id="3080" name="Picture 8"/>
+          <p:cNvPicPr>
+            <a:picLocks noChangeAspect="1" noChangeArrowheads="1"/>
+          </p:cNvPicPr>
           <p:nvPr/>
-        </p:nvSpPr>
-        <p:spPr>
+        </p:nvPicPr>
+        <p:blipFill>
+          <a:blip r:embed="rId4">
+            <a:extLst>
+              <a:ext uri="{28A0092B-C50C-407E-A947-70E740481C1C}">
+                <a14:useLocalDpi xmlns:a14="http://schemas.microsoft.com/office/drawing/2010/main" val="0"/>
+              </a:ext>
+            </a:extLst>
+          </a:blip>
+          <a:srcRect/>
+          <a:stretch>
+            <a:fillRect/>
+          </a:stretch>
+        </p:blipFill>
+        <p:spPr bwMode="auto">
           <a:xfrm>
-            <a:off x="467544" y="3507854"/>
-            <a:ext cx="2376264" cy="369332"/>
+            <a:off x="899592" y="3920462"/>
+            <a:ext cx="1866795" cy="379480"/>
           </a:xfrm>
           <a:prstGeom prst="rect">
             <a:avLst/>
           </a:prstGeom>
           <a:noFill/>
+          <a:ln>
+            <a:noFill/>
+          </a:ln>
+          <a:effectLst/>
+          <a:extLst>
+            <a:ext uri="{909E8E84-426E-40DD-AFC4-6F175D3DCCD1}">
+              <a14:hiddenFill xmlns:a14="http://schemas.microsoft.com/office/drawing/2010/main">
+                <a:solidFill>
+                  <a:schemeClr val="accent1"/>
+                </a:solidFill>
+              </a14:hiddenFill>
+            </a:ext>
+            <a:ext uri="{91240B29-F687-4F45-9708-019B960494DF}">
+              <a14:hiddenLine xmlns:a14="http://schemas.microsoft.com/office/drawing/2010/main" w="9525">
+                <a:solidFill>
+                  <a:schemeClr val="tx1"/>
+                </a:solidFill>
+                <a:miter lim="800000"/>
+                <a:headEnd/>
+                <a:tailEnd/>
+              </a14:hiddenLine>
+            </a:ext>
+            <a:ext uri="{AF507438-7753-43E0-B8FC-AC1667EBCBE1}">
+              <a14:hiddenEffects xmlns:a14="http://schemas.microsoft.com/office/drawing/2010/main">
+                <a:effectLst>
+                  <a:outerShdw dist="35921" dir="2700000" algn="ctr" rotWithShape="0">
+                    <a:schemeClr val="bg2"/>
+                  </a:outerShdw>
+                </a:effectLst>
+              </a14:hiddenEffects>
+            </a:ext>
+          </a:extLst>
         </p:spPr>
-        <p:txBody>
-          <a:bodyPr wrap="square" rtlCol="0">
-            <a:spAutoFit/>
-          </a:bodyPr>
-          <a:lstStyle/>
-          <a:p>
-            <a:r>
-              <a:rPr lang="pl-PL" dirty="0" smtClean="0">
-                <a:latin typeface="Verdana" panose="020B0604030504040204" pitchFamily="34" charset="0"/>
-                <a:ea typeface="Verdana" panose="020B0604030504040204" pitchFamily="34" charset="0"/>
-              </a:rPr>
-              <a:t>TARNÓW 2020</a:t>
-            </a:r>
-            <a:endParaRPr lang="en-US" dirty="0">
-              <a:latin typeface="Verdana" panose="020B0604030504040204" pitchFamily="34" charset="0"/>
-              <a:ea typeface="Verdana" panose="020B0604030504040204" pitchFamily="34" charset="0"/>
-            </a:endParaRPr>
-          </a:p>
-        </p:txBody>
-      </p:sp>
-      <p:sp>
-        <p:nvSpPr>
-          <p:cNvPr id="7" name="pole tekstowe 6"/>
-          <p:cNvSpPr txBox="1"/>
+      </p:pic>
+      <p:pic>
+        <p:nvPicPr>
+          <p:cNvPr id="1028" name="Picture 4"/>
+          <p:cNvPicPr>
+            <a:picLocks noChangeAspect="1" noChangeArrowheads="1"/>
+          </p:cNvPicPr>
           <p:nvPr/>
-        </p:nvSpPr>
-        <p:spPr>
+        </p:nvPicPr>
+        <p:blipFill>
+          <a:blip r:embed="rId5">
+            <a:extLst>
+              <a:ext uri="{28A0092B-C50C-407E-A947-70E740481C1C}">
+                <a14:useLocalDpi xmlns:a14="http://schemas.microsoft.com/office/drawing/2010/main" val="0"/>
+              </a:ext>
+            </a:extLst>
+          </a:blip>
+          <a:srcRect/>
+          <a:stretch>
+            <a:fillRect/>
+          </a:stretch>
+        </p:blipFill>
+        <p:spPr bwMode="auto">
           <a:xfrm>
-            <a:off x="467544" y="2412404"/>
-            <a:ext cx="2952328" cy="584775"/>
+            <a:off x="899593" y="3003799"/>
+            <a:ext cx="4104456" cy="572104"/>
           </a:xfrm>
           <a:prstGeom prst="rect">
             <a:avLst/>
           </a:prstGeom>
           <a:noFill/>
+          <a:ln>
+            <a:noFill/>
+          </a:ln>
+          <a:effectLst/>
+          <a:extLst>
+            <a:ext uri="{909E8E84-426E-40DD-AFC4-6F175D3DCCD1}">
+              <a14:hiddenFill xmlns:a14="http://schemas.microsoft.com/office/drawing/2010/main">
+                <a:solidFill>
+                  <a:schemeClr val="accent1"/>
+                </a:solidFill>
+              </a14:hiddenFill>
+            </a:ext>
+            <a:ext uri="{91240B29-F687-4F45-9708-019B960494DF}">
+              <a14:hiddenLine xmlns:a14="http://schemas.microsoft.com/office/drawing/2010/main" w="9525">
+                <a:solidFill>
+                  <a:schemeClr val="tx1"/>
+                </a:solidFill>
+                <a:miter lim="800000"/>
+                <a:headEnd/>
+                <a:tailEnd/>
+              </a14:hiddenLine>
+            </a:ext>
+            <a:ext uri="{AF507438-7753-43E0-B8FC-AC1667EBCBE1}">
+              <a14:hiddenEffects xmlns:a14="http://schemas.microsoft.com/office/drawing/2010/main">
+                <a:effectLst>
+                  <a:outerShdw dist="35921" dir="2700000" algn="ctr" rotWithShape="0">
+                    <a:schemeClr val="bg2"/>
+                  </a:outerShdw>
+                </a:effectLst>
+              </a14:hiddenEffects>
+            </a:ext>
+          </a:extLst>
         </p:spPr>
-        <p:txBody>
-          <a:bodyPr wrap="square" rtlCol="0">
-            <a:spAutoFit/>
-          </a:bodyPr>
-          <a:lstStyle/>
-          <a:p>
-            <a:r>
-              <a:rPr lang="pl-PL" sz="3200" dirty="0" smtClean="0">
-                <a:latin typeface="Verdana" panose="020B0604030504040204" pitchFamily="34" charset="0"/>
-                <a:ea typeface="Verdana" panose="020B0604030504040204" pitchFamily="34" charset="0"/>
-              </a:rPr>
-              <a:t>DZIĘKUJEMY</a:t>
-            </a:r>
-            <a:endParaRPr lang="en-US" sz="3200" dirty="0">
-              <a:latin typeface="Verdana" panose="020B0604030504040204" pitchFamily="34" charset="0"/>
-              <a:ea typeface="Verdana" panose="020B0604030504040204" pitchFamily="34" charset="0"/>
-            </a:endParaRPr>
-          </a:p>
-        </p:txBody>
-      </p:sp>
+      </p:pic>
     </p:spTree>
     <p:extLst>
       <p:ext uri="{BB962C8B-B14F-4D97-AF65-F5344CB8AC3E}">
-        <p14:creationId xmlns:p14="http://schemas.microsoft.com/office/powerpoint/2010/main" val="397827909"/>
+        <p14:creationId xmlns:p14="http://schemas.microsoft.com/office/powerpoint/2010/main" val="1168351331"/>
+      </p:ext>
+    </p:extLst>
+  </p:cSld>
+  <p:clrMapOvr>
+    <a:masterClrMapping/>
+  </p:clrMapOvr>
+</p:sld>
+</file>
+
+<file path=ppt/slides/slide25.xml><?xml version="1.0" encoding="utf-8"?>
+<p:sld xmlns:a="http://schemas.openxmlformats.org/drawingml/2006/main" xmlns:r="http://schemas.openxmlformats.org/officeDocument/2006/relationships" xmlns:p="http://schemas.openxmlformats.org/presentationml/2006/main">
+  <p:cSld>
+    <p:spTree>
+      <p:nvGrpSpPr>
+        <p:cNvPr id="1" name=""/>
+        <p:cNvGrpSpPr/>
+        <p:nvPr/>
+      </p:nvGrpSpPr>
+      <p:grpSpPr>
+        <a:xfrm>
+          <a:off x="0" y="0"/>
+          <a:ext cx="0" cy="0"/>
+          <a:chOff x="0" y="0"/>
+          <a:chExt cx="0" cy="0"/>
+        </a:xfrm>
+      </p:grpSpPr>
+      <p:sp>
+        <p:nvSpPr>
+          <p:cNvPr id="3" name="Symbol zastępczy zawartości 2"/>
+          <p:cNvSpPr>
+            <a:spLocks noGrp="1"/>
+          </p:cNvSpPr>
+          <p:nvPr>
+            <p:ph idx="1"/>
+          </p:nvPr>
+        </p:nvSpPr>
+        <p:spPr/>
+        <p:txBody>
+          <a:bodyPr>
+            <a:normAutofit/>
+          </a:bodyPr>
+          <a:lstStyle/>
+          <a:p>
+            <a:r>
+              <a:rPr lang="pl-PL" sz="1200" dirty="0" smtClean="0">
+                <a:latin typeface="Lucida Console" panose="020B0609040504020204" pitchFamily="49" charset="0"/>
+              </a:rPr>
+              <a:t>Wprowadźmy zmianę w pliku first.txt</a:t>
+            </a:r>
+          </a:p>
+          <a:p>
+            <a:endParaRPr lang="pl-PL" sz="1200" dirty="0">
+              <a:latin typeface="Lucida Console" panose="020B0609040504020204" pitchFamily="49" charset="0"/>
+            </a:endParaRPr>
+          </a:p>
+          <a:p>
+            <a:r>
+              <a:rPr lang="pl-PL" sz="1200" dirty="0" smtClean="0">
+                <a:latin typeface="Lucida Console" panose="020B0609040504020204" pitchFamily="49" charset="0"/>
+              </a:rPr>
+              <a:t>I sprawdźmy status repozytorium</a:t>
+            </a:r>
+          </a:p>
+          <a:p>
+            <a:endParaRPr lang="pl-PL" sz="1200" dirty="0">
+              <a:latin typeface="Lucida Console" panose="020B0609040504020204" pitchFamily="49" charset="0"/>
+            </a:endParaRPr>
+          </a:p>
+          <a:p>
+            <a:endParaRPr lang="pl-PL" sz="1200" dirty="0" smtClean="0">
+              <a:latin typeface="Lucida Console" panose="020B0609040504020204" pitchFamily="49" charset="0"/>
+            </a:endParaRPr>
+          </a:p>
+          <a:p>
+            <a:endParaRPr lang="pl-PL" sz="1200" dirty="0">
+              <a:latin typeface="Lucida Console" panose="020B0609040504020204" pitchFamily="49" charset="0"/>
+            </a:endParaRPr>
+          </a:p>
+          <a:p>
+            <a:endParaRPr lang="pl-PL" sz="1200" dirty="0" smtClean="0">
+              <a:latin typeface="Lucida Console" panose="020B0609040504020204" pitchFamily="49" charset="0"/>
+            </a:endParaRPr>
+          </a:p>
+          <a:p>
+            <a:r>
+              <a:rPr lang="pl-PL" sz="1200" dirty="0" smtClean="0">
+                <a:latin typeface="Lucida Console" panose="020B0609040504020204" pitchFamily="49" charset="0"/>
+              </a:rPr>
+              <a:t>Dodajmy zmianę do stage i zróbmy </a:t>
+            </a:r>
+            <a:r>
+              <a:rPr lang="pl-PL" sz="1200" dirty="0" err="1" smtClean="0">
+                <a:latin typeface="Lucida Console" panose="020B0609040504020204" pitchFamily="49" charset="0"/>
+              </a:rPr>
+              <a:t>commit</a:t>
+            </a:r>
+            <a:r>
+              <a:rPr lang="pl-PL" sz="1200" dirty="0">
+                <a:latin typeface="Lucida Console" panose="020B0609040504020204" pitchFamily="49" charset="0"/>
+              </a:rPr>
+              <a:t> </a:t>
+            </a:r>
+            <a:r>
+              <a:rPr lang="pl-PL" sz="1200" dirty="0" smtClean="0">
+                <a:latin typeface="Lucida Console" panose="020B0609040504020204" pitchFamily="49" charset="0"/>
+              </a:rPr>
+              <a:t>(flaga –</a:t>
+            </a:r>
+            <a:r>
+              <a:rPr lang="pl-PL" sz="1200" dirty="0" err="1" smtClean="0">
+                <a:latin typeface="Lucida Console" panose="020B0609040504020204" pitchFamily="49" charset="0"/>
+              </a:rPr>
+              <a:t>am</a:t>
+            </a:r>
+            <a:r>
+              <a:rPr lang="pl-PL" sz="1200" dirty="0" smtClean="0">
+                <a:latin typeface="Lucida Console" panose="020B0609040504020204" pitchFamily="49" charset="0"/>
+              </a:rPr>
+              <a:t>) </a:t>
+            </a:r>
+            <a:endParaRPr lang="pl-PL" sz="1200" dirty="0">
+              <a:latin typeface="Lucida Console" panose="020B0609040504020204" pitchFamily="49" charset="0"/>
+            </a:endParaRPr>
+          </a:p>
+          <a:p>
+            <a:endParaRPr lang="pl-PL" sz="1200" dirty="0" smtClean="0">
+              <a:latin typeface="Lucida Console" panose="020B0609040504020204" pitchFamily="49" charset="0"/>
+            </a:endParaRPr>
+          </a:p>
+          <a:p>
+            <a:pPr marL="0" indent="0">
+              <a:buNone/>
+            </a:pPr>
+            <a:endParaRPr lang="pl-PL" sz="1200" dirty="0" smtClean="0">
+              <a:latin typeface="Lucida Console" panose="020B0609040504020204" pitchFamily="49" charset="0"/>
+            </a:endParaRPr>
+          </a:p>
+          <a:p>
+            <a:pPr marL="0" indent="0">
+              <a:buNone/>
+            </a:pPr>
+            <a:endParaRPr lang="pl-PL" sz="1200" dirty="0" smtClean="0">
+              <a:latin typeface="Lucida Console" panose="020B0609040504020204" pitchFamily="49" charset="0"/>
+            </a:endParaRPr>
+          </a:p>
+        </p:txBody>
+      </p:sp>
+      <p:pic>
+        <p:nvPicPr>
+          <p:cNvPr id="2" name="Picture 4"/>
+          <p:cNvPicPr>
+            <a:picLocks noChangeAspect="1" noChangeArrowheads="1"/>
+          </p:cNvPicPr>
+          <p:nvPr/>
+        </p:nvPicPr>
+        <p:blipFill>
+          <a:blip r:embed="rId2">
+            <a:extLst>
+              <a:ext uri="{28A0092B-C50C-407E-A947-70E740481C1C}">
+                <a14:useLocalDpi xmlns:a14="http://schemas.microsoft.com/office/drawing/2010/main" val="0"/>
+              </a:ext>
+            </a:extLst>
+          </a:blip>
+          <a:srcRect/>
+          <a:stretch>
+            <a:fillRect/>
+          </a:stretch>
+        </p:blipFill>
+        <p:spPr bwMode="auto">
+          <a:xfrm>
+            <a:off x="1187624" y="1486275"/>
+            <a:ext cx="4104456" cy="149371"/>
+          </a:xfrm>
+          <a:prstGeom prst="rect">
+            <a:avLst/>
+          </a:prstGeom>
+          <a:noFill/>
+          <a:ln>
+            <a:noFill/>
+          </a:ln>
+          <a:effectLst/>
+          <a:extLst>
+            <a:ext uri="{909E8E84-426E-40DD-AFC4-6F175D3DCCD1}">
+              <a14:hiddenFill xmlns:a14="http://schemas.microsoft.com/office/drawing/2010/main">
+                <a:solidFill>
+                  <a:schemeClr val="accent1"/>
+                </a:solidFill>
+              </a14:hiddenFill>
+            </a:ext>
+            <a:ext uri="{91240B29-F687-4F45-9708-019B960494DF}">
+              <a14:hiddenLine xmlns:a14="http://schemas.microsoft.com/office/drawing/2010/main" w="9525">
+                <a:solidFill>
+                  <a:schemeClr val="tx1"/>
+                </a:solidFill>
+                <a:miter lim="800000"/>
+                <a:headEnd/>
+                <a:tailEnd/>
+              </a14:hiddenLine>
+            </a:ext>
+            <a:ext uri="{AF507438-7753-43E0-B8FC-AC1667EBCBE1}">
+              <a14:hiddenEffects xmlns:a14="http://schemas.microsoft.com/office/drawing/2010/main">
+                <a:effectLst>
+                  <a:outerShdw dist="35921" dir="2700000" algn="ctr" rotWithShape="0">
+                    <a:schemeClr val="bg2"/>
+                  </a:outerShdw>
+                </a:effectLst>
+              </a14:hiddenEffects>
+            </a:ext>
+          </a:extLst>
+        </p:spPr>
+      </p:pic>
+      <p:pic>
+        <p:nvPicPr>
+          <p:cNvPr id="3078" name="Picture 6"/>
+          <p:cNvPicPr>
+            <a:picLocks noChangeAspect="1" noChangeArrowheads="1"/>
+          </p:cNvPicPr>
+          <p:nvPr/>
+        </p:nvPicPr>
+        <p:blipFill>
+          <a:blip r:embed="rId3">
+            <a:extLst>
+              <a:ext uri="{28A0092B-C50C-407E-A947-70E740481C1C}">
+                <a14:useLocalDpi xmlns:a14="http://schemas.microsoft.com/office/drawing/2010/main" val="0"/>
+              </a:ext>
+            </a:extLst>
+          </a:blip>
+          <a:srcRect/>
+          <a:stretch>
+            <a:fillRect/>
+          </a:stretch>
+        </p:blipFill>
+        <p:spPr bwMode="auto">
+          <a:xfrm>
+            <a:off x="1163489" y="1915096"/>
+            <a:ext cx="5253177" cy="872678"/>
+          </a:xfrm>
+          <a:prstGeom prst="rect">
+            <a:avLst/>
+          </a:prstGeom>
+          <a:noFill/>
+          <a:ln>
+            <a:noFill/>
+          </a:ln>
+          <a:effectLst/>
+          <a:extLst>
+            <a:ext uri="{909E8E84-426E-40DD-AFC4-6F175D3DCCD1}">
+              <a14:hiddenFill xmlns:a14="http://schemas.microsoft.com/office/drawing/2010/main">
+                <a:solidFill>
+                  <a:schemeClr val="accent1"/>
+                </a:solidFill>
+              </a14:hiddenFill>
+            </a:ext>
+            <a:ext uri="{91240B29-F687-4F45-9708-019B960494DF}">
+              <a14:hiddenLine xmlns:a14="http://schemas.microsoft.com/office/drawing/2010/main" w="9525">
+                <a:solidFill>
+                  <a:schemeClr val="tx1"/>
+                </a:solidFill>
+                <a:miter lim="800000"/>
+                <a:headEnd/>
+                <a:tailEnd/>
+              </a14:hiddenLine>
+            </a:ext>
+            <a:ext uri="{AF507438-7753-43E0-B8FC-AC1667EBCBE1}">
+              <a14:hiddenEffects xmlns:a14="http://schemas.microsoft.com/office/drawing/2010/main">
+                <a:effectLst>
+                  <a:outerShdw dist="35921" dir="2700000" algn="ctr" rotWithShape="0">
+                    <a:schemeClr val="bg2"/>
+                  </a:outerShdw>
+                </a:effectLst>
+              </a14:hiddenEffects>
+            </a:ext>
+          </a:extLst>
+        </p:spPr>
+      </p:pic>
+      <p:pic>
+        <p:nvPicPr>
+          <p:cNvPr id="3079" name="Picture 7"/>
+          <p:cNvPicPr>
+            <a:picLocks noChangeAspect="1" noChangeArrowheads="1"/>
+          </p:cNvPicPr>
+          <p:nvPr/>
+        </p:nvPicPr>
+        <p:blipFill>
+          <a:blip r:embed="rId4">
+            <a:extLst>
+              <a:ext uri="{28A0092B-C50C-407E-A947-70E740481C1C}">
+                <a14:useLocalDpi xmlns:a14="http://schemas.microsoft.com/office/drawing/2010/main" val="0"/>
+              </a:ext>
+            </a:extLst>
+          </a:blip>
+          <a:srcRect/>
+          <a:stretch>
+            <a:fillRect/>
+          </a:stretch>
+        </p:blipFill>
+        <p:spPr bwMode="auto">
+          <a:xfrm>
+            <a:off x="1187624" y="3075807"/>
+            <a:ext cx="4968552" cy="533182"/>
+          </a:xfrm>
+          <a:prstGeom prst="rect">
+            <a:avLst/>
+          </a:prstGeom>
+          <a:noFill/>
+          <a:ln>
+            <a:noFill/>
+          </a:ln>
+          <a:effectLst/>
+          <a:extLst>
+            <a:ext uri="{909E8E84-426E-40DD-AFC4-6F175D3DCCD1}">
+              <a14:hiddenFill xmlns:a14="http://schemas.microsoft.com/office/drawing/2010/main">
+                <a:solidFill>
+                  <a:schemeClr val="accent1"/>
+                </a:solidFill>
+              </a14:hiddenFill>
+            </a:ext>
+            <a:ext uri="{91240B29-F687-4F45-9708-019B960494DF}">
+              <a14:hiddenLine xmlns:a14="http://schemas.microsoft.com/office/drawing/2010/main" w="9525">
+                <a:solidFill>
+                  <a:schemeClr val="tx1"/>
+                </a:solidFill>
+                <a:miter lim="800000"/>
+                <a:headEnd/>
+                <a:tailEnd/>
+              </a14:hiddenLine>
+            </a:ext>
+            <a:ext uri="{AF507438-7753-43E0-B8FC-AC1667EBCBE1}">
+              <a14:hiddenEffects xmlns:a14="http://schemas.microsoft.com/office/drawing/2010/main">
+                <a:effectLst>
+                  <a:outerShdw dist="35921" dir="2700000" algn="ctr" rotWithShape="0">
+                    <a:schemeClr val="bg2"/>
+                  </a:outerShdw>
+                </a:effectLst>
+              </a14:hiddenEffects>
+            </a:ext>
+          </a:extLst>
+        </p:spPr>
+      </p:pic>
+    </p:spTree>
+    <p:extLst>
+      <p:ext uri="{BB962C8B-B14F-4D97-AF65-F5344CB8AC3E}">
+        <p14:creationId xmlns:p14="http://schemas.microsoft.com/office/powerpoint/2010/main" val="71955294"/>
+      </p:ext>
+    </p:extLst>
+  </p:cSld>
+  <p:clrMapOvr>
+    <a:masterClrMapping/>
+  </p:clrMapOvr>
+</p:sld>
+</file>
+
+<file path=ppt/slides/slide26.xml><?xml version="1.0" encoding="utf-8"?>
+<p:sld xmlns:a="http://schemas.openxmlformats.org/drawingml/2006/main" xmlns:r="http://schemas.openxmlformats.org/officeDocument/2006/relationships" xmlns:p="http://schemas.openxmlformats.org/presentationml/2006/main">
+  <p:cSld>
+    <p:spTree>
+      <p:nvGrpSpPr>
+        <p:cNvPr id="1" name=""/>
+        <p:cNvGrpSpPr/>
+        <p:nvPr/>
+      </p:nvGrpSpPr>
+      <p:grpSpPr>
+        <a:xfrm>
+          <a:off x="0" y="0"/>
+          <a:ext cx="0" cy="0"/>
+          <a:chOff x="0" y="0"/>
+          <a:chExt cx="0" cy="0"/>
+        </a:xfrm>
+      </p:grpSpPr>
+      <p:sp>
+        <p:nvSpPr>
+          <p:cNvPr id="3" name="Symbol zastępczy zawartości 2"/>
+          <p:cNvSpPr>
+            <a:spLocks noGrp="1"/>
+          </p:cNvSpPr>
+          <p:nvPr>
+            <p:ph idx="1"/>
+          </p:nvPr>
+        </p:nvSpPr>
+        <p:spPr/>
+        <p:txBody>
+          <a:bodyPr>
+            <a:normAutofit/>
+          </a:bodyPr>
+          <a:lstStyle/>
+          <a:p>
+            <a:r>
+              <a:rPr lang="pl-PL" sz="1200" dirty="0" smtClean="0">
+                <a:latin typeface="Lucida Console" panose="020B0609040504020204" pitchFamily="49" charset="0"/>
+              </a:rPr>
+              <a:t>Sprawdźmy historię zmian</a:t>
+            </a:r>
+            <a:endParaRPr lang="pl-PL" sz="1200" dirty="0" smtClean="0">
+              <a:latin typeface="Lucida Console" panose="020B0609040504020204" pitchFamily="49" charset="0"/>
+            </a:endParaRPr>
+          </a:p>
+        </p:txBody>
+      </p:sp>
+      <p:pic>
+        <p:nvPicPr>
+          <p:cNvPr id="5123" name="Picture 3"/>
+          <p:cNvPicPr>
+            <a:picLocks noChangeAspect="1" noChangeArrowheads="1"/>
+          </p:cNvPicPr>
+          <p:nvPr/>
+        </p:nvPicPr>
+        <p:blipFill>
+          <a:blip r:embed="rId2">
+            <a:extLst>
+              <a:ext uri="{28A0092B-C50C-407E-A947-70E740481C1C}">
+                <a14:useLocalDpi xmlns:a14="http://schemas.microsoft.com/office/drawing/2010/main" val="0"/>
+              </a:ext>
+            </a:extLst>
+          </a:blip>
+          <a:srcRect/>
+          <a:stretch>
+            <a:fillRect/>
+          </a:stretch>
+        </p:blipFill>
+        <p:spPr bwMode="auto">
+          <a:xfrm>
+            <a:off x="899592" y="1595439"/>
+            <a:ext cx="3740731" cy="904304"/>
+          </a:xfrm>
+          <a:prstGeom prst="rect">
+            <a:avLst/>
+          </a:prstGeom>
+          <a:noFill/>
+          <a:ln>
+            <a:noFill/>
+          </a:ln>
+          <a:effectLst/>
+          <a:extLst>
+            <a:ext uri="{909E8E84-426E-40DD-AFC4-6F175D3DCCD1}">
+              <a14:hiddenFill xmlns:a14="http://schemas.microsoft.com/office/drawing/2010/main">
+                <a:solidFill>
+                  <a:schemeClr val="accent1"/>
+                </a:solidFill>
+              </a14:hiddenFill>
+            </a:ext>
+            <a:ext uri="{91240B29-F687-4F45-9708-019B960494DF}">
+              <a14:hiddenLine xmlns:a14="http://schemas.microsoft.com/office/drawing/2010/main" w="9525">
+                <a:solidFill>
+                  <a:schemeClr val="tx1"/>
+                </a:solidFill>
+                <a:miter lim="800000"/>
+                <a:headEnd/>
+                <a:tailEnd/>
+              </a14:hiddenLine>
+            </a:ext>
+            <a:ext uri="{AF507438-7753-43E0-B8FC-AC1667EBCBE1}">
+              <a14:hiddenEffects xmlns:a14="http://schemas.microsoft.com/office/drawing/2010/main">
+                <a:effectLst>
+                  <a:outerShdw dist="35921" dir="2700000" algn="ctr" rotWithShape="0">
+                    <a:schemeClr val="bg2"/>
+                  </a:outerShdw>
+                </a:effectLst>
+              </a14:hiddenEffects>
+            </a:ext>
+          </a:extLst>
+        </p:spPr>
+      </p:pic>
+    </p:spTree>
+    <p:extLst>
+      <p:ext uri="{BB962C8B-B14F-4D97-AF65-F5344CB8AC3E}">
+        <p14:creationId xmlns:p14="http://schemas.microsoft.com/office/powerpoint/2010/main" val="1824203019"/>
+      </p:ext>
+    </p:extLst>
+  </p:cSld>
+  <p:clrMapOvr>
+    <a:masterClrMapping/>
+  </p:clrMapOvr>
+</p:sld>
+</file>
+
+<file path=ppt/slides/slide27.xml><?xml version="1.0" encoding="utf-8"?>
+<p:sld xmlns:a="http://schemas.openxmlformats.org/drawingml/2006/main" xmlns:r="http://schemas.openxmlformats.org/officeDocument/2006/relationships" xmlns:p="http://schemas.openxmlformats.org/presentationml/2006/main">
+  <p:cSld>
+    <p:spTree>
+      <p:nvGrpSpPr>
+        <p:cNvPr id="1" name=""/>
+        <p:cNvGrpSpPr/>
+        <p:nvPr/>
+      </p:nvGrpSpPr>
+      <p:grpSpPr>
+        <a:xfrm>
+          <a:off x="0" y="0"/>
+          <a:ext cx="0" cy="0"/>
+          <a:chOff x="0" y="0"/>
+          <a:chExt cx="0" cy="0"/>
+        </a:xfrm>
+      </p:grpSpPr>
+      <p:sp>
+        <p:nvSpPr>
+          <p:cNvPr id="2" name="Tytuł 1"/>
+          <p:cNvSpPr>
+            <a:spLocks noGrp="1"/>
+          </p:cNvSpPr>
+          <p:nvPr>
+            <p:ph type="title"/>
+          </p:nvPr>
+        </p:nvSpPr>
+        <p:spPr/>
+        <p:txBody>
+          <a:bodyPr/>
+          <a:lstStyle/>
+          <a:p>
+            <a:endParaRPr lang="pl-PL"/>
+          </a:p>
+        </p:txBody>
+      </p:sp>
+      <p:sp>
+        <p:nvSpPr>
+          <p:cNvPr id="3" name="Symbol zastępczy zawartości 2"/>
+          <p:cNvSpPr>
+            <a:spLocks noGrp="1"/>
+          </p:cNvSpPr>
+          <p:nvPr>
+            <p:ph idx="1"/>
+          </p:nvPr>
+        </p:nvSpPr>
+        <p:spPr/>
+        <p:txBody>
+          <a:bodyPr/>
+          <a:lstStyle/>
+          <a:p>
+            <a:endParaRPr lang="pl-PL" dirty="0"/>
+          </a:p>
+        </p:txBody>
+      </p:sp>
+    </p:spTree>
+    <p:extLst>
+      <p:ext uri="{BB962C8B-B14F-4D97-AF65-F5344CB8AC3E}">
+        <p14:creationId xmlns:p14="http://schemas.microsoft.com/office/powerpoint/2010/main" val="2417525422"/>
+      </p:ext>
+    </p:extLst>
+  </p:cSld>
+  <p:clrMapOvr>
+    <a:masterClrMapping/>
+  </p:clrMapOvr>
+</p:sld>
+</file>
+
+<file path=ppt/slides/slide28.xml><?xml version="1.0" encoding="utf-8"?>
+<p:sld xmlns:a="http://schemas.openxmlformats.org/drawingml/2006/main" xmlns:r="http://schemas.openxmlformats.org/officeDocument/2006/relationships" xmlns:p="http://schemas.openxmlformats.org/presentationml/2006/main">
+  <p:cSld>
+    <p:spTree>
+      <p:nvGrpSpPr>
+        <p:cNvPr id="1" name=""/>
+        <p:cNvGrpSpPr/>
+        <p:nvPr/>
+      </p:nvGrpSpPr>
+      <p:grpSpPr>
+        <a:xfrm>
+          <a:off x="0" y="0"/>
+          <a:ext cx="0" cy="0"/>
+          <a:chOff x="0" y="0"/>
+          <a:chExt cx="0" cy="0"/>
+        </a:xfrm>
+      </p:grpSpPr>
+      <p:sp>
+        <p:nvSpPr>
+          <p:cNvPr id="2" name="Tytuł 1"/>
+          <p:cNvSpPr>
+            <a:spLocks noGrp="1"/>
+          </p:cNvSpPr>
+          <p:nvPr>
+            <p:ph type="title"/>
+          </p:nvPr>
+        </p:nvSpPr>
+        <p:spPr/>
+        <p:txBody>
+          <a:bodyPr/>
+          <a:lstStyle/>
+          <a:p>
+            <a:endParaRPr lang="pl-PL"/>
+          </a:p>
+        </p:txBody>
+      </p:sp>
+      <p:sp>
+        <p:nvSpPr>
+          <p:cNvPr id="3" name="Symbol zastępczy zawartości 2"/>
+          <p:cNvSpPr>
+            <a:spLocks noGrp="1"/>
+          </p:cNvSpPr>
+          <p:nvPr>
+            <p:ph idx="1"/>
+          </p:nvPr>
+        </p:nvSpPr>
+        <p:spPr/>
+        <p:txBody>
+          <a:bodyPr/>
+          <a:lstStyle/>
+          <a:p>
+            <a:endParaRPr lang="pl-PL"/>
+          </a:p>
+        </p:txBody>
+      </p:sp>
+    </p:spTree>
+    <p:extLst>
+      <p:ext uri="{BB962C8B-B14F-4D97-AF65-F5344CB8AC3E}">
+        <p14:creationId xmlns:p14="http://schemas.microsoft.com/office/powerpoint/2010/main" val="2417525422"/>
+      </p:ext>
+    </p:extLst>
+  </p:cSld>
+  <p:clrMapOvr>
+    <a:masterClrMapping/>
+  </p:clrMapOvr>
+</p:sld>
+</file>
+
+<file path=ppt/slides/slide29.xml><?xml version="1.0" encoding="utf-8"?>
+<p:sld xmlns:a="http://schemas.openxmlformats.org/drawingml/2006/main" xmlns:r="http://schemas.openxmlformats.org/officeDocument/2006/relationships" xmlns:p="http://schemas.openxmlformats.org/presentationml/2006/main">
+  <p:cSld>
+    <p:spTree>
+      <p:nvGrpSpPr>
+        <p:cNvPr id="1" name=""/>
+        <p:cNvGrpSpPr/>
+        <p:nvPr/>
+      </p:nvGrpSpPr>
+      <p:grpSpPr>
+        <a:xfrm>
+          <a:off x="0" y="0"/>
+          <a:ext cx="0" cy="0"/>
+          <a:chOff x="0" y="0"/>
+          <a:chExt cx="0" cy="0"/>
+        </a:xfrm>
+      </p:grpSpPr>
+      <p:sp>
+        <p:nvSpPr>
+          <p:cNvPr id="2" name="Tytuł 1"/>
+          <p:cNvSpPr>
+            <a:spLocks noGrp="1"/>
+          </p:cNvSpPr>
+          <p:nvPr>
+            <p:ph type="title"/>
+          </p:nvPr>
+        </p:nvSpPr>
+        <p:spPr/>
+        <p:txBody>
+          <a:bodyPr/>
+          <a:lstStyle/>
+          <a:p>
+            <a:endParaRPr lang="pl-PL"/>
+          </a:p>
+        </p:txBody>
+      </p:sp>
+      <p:sp>
+        <p:nvSpPr>
+          <p:cNvPr id="3" name="Symbol zastępczy zawartości 2"/>
+          <p:cNvSpPr>
+            <a:spLocks noGrp="1"/>
+          </p:cNvSpPr>
+          <p:nvPr>
+            <p:ph idx="1"/>
+          </p:nvPr>
+        </p:nvSpPr>
+        <p:spPr/>
+        <p:txBody>
+          <a:bodyPr/>
+          <a:lstStyle/>
+          <a:p>
+            <a:endParaRPr lang="pl-PL"/>
+          </a:p>
+        </p:txBody>
+      </p:sp>
+    </p:spTree>
+    <p:extLst>
+      <p:ext uri="{BB962C8B-B14F-4D97-AF65-F5344CB8AC3E}">
+        <p14:creationId xmlns:p14="http://schemas.microsoft.com/office/powerpoint/2010/main" val="2417525422"/>
       </p:ext>
     </p:extLst>
   </p:cSld>
@@ -6070,6 +7509,362 @@
     <p:extLst>
       <p:ext uri="{BB962C8B-B14F-4D97-AF65-F5344CB8AC3E}">
         <p14:creationId xmlns:p14="http://schemas.microsoft.com/office/powerpoint/2010/main" val="352483500"/>
+      </p:ext>
+    </p:extLst>
+  </p:cSld>
+  <p:clrMapOvr>
+    <a:masterClrMapping/>
+  </p:clrMapOvr>
+</p:sld>
+</file>
+
+<file path=ppt/slides/slide30.xml><?xml version="1.0" encoding="utf-8"?>
+<p:sld xmlns:a="http://schemas.openxmlformats.org/drawingml/2006/main" xmlns:r="http://schemas.openxmlformats.org/officeDocument/2006/relationships" xmlns:p="http://schemas.openxmlformats.org/presentationml/2006/main">
+  <p:cSld>
+    <p:spTree>
+      <p:nvGrpSpPr>
+        <p:cNvPr id="1" name=""/>
+        <p:cNvGrpSpPr/>
+        <p:nvPr/>
+      </p:nvGrpSpPr>
+      <p:grpSpPr>
+        <a:xfrm>
+          <a:off x="0" y="0"/>
+          <a:ext cx="0" cy="0"/>
+          <a:chOff x="0" y="0"/>
+          <a:chExt cx="0" cy="0"/>
+        </a:xfrm>
+      </p:grpSpPr>
+      <p:sp>
+        <p:nvSpPr>
+          <p:cNvPr id="3" name="Symbol zastępczy zawartości 2"/>
+          <p:cNvSpPr>
+            <a:spLocks noGrp="1"/>
+          </p:cNvSpPr>
+          <p:nvPr>
+            <p:ph idx="1"/>
+          </p:nvPr>
+        </p:nvSpPr>
+        <p:spPr/>
+        <p:txBody>
+          <a:bodyPr>
+            <a:normAutofit/>
+          </a:bodyPr>
+          <a:lstStyle/>
+          <a:p>
+            <a:pPr marL="0" indent="0">
+              <a:buNone/>
+            </a:pPr>
+            <a:r>
+              <a:rPr lang="pl-PL" sz="1200" dirty="0" smtClean="0"/>
+              <a:t>Linki</a:t>
+            </a:r>
+          </a:p>
+          <a:p>
+            <a:pPr marL="0" indent="0">
+              <a:buNone/>
+            </a:pPr>
+            <a:r>
+              <a:rPr lang="en-US" sz="1200" dirty="0">
+                <a:hlinkClick r:id="rId2"/>
+              </a:rPr>
+              <a:t>https://it-consulting.pl/autoinstalator/wordpress/2011/03/22/co-wybrac-czyli-cykl-zycia-projektu-tworzenia-oprogramowania/#.</a:t>
+            </a:r>
+            <a:r>
+              <a:rPr lang="en-US" sz="1200" dirty="0" smtClean="0">
+                <a:hlinkClick r:id="rId2"/>
+              </a:rPr>
+              <a:t>YES3VRLdiUk</a:t>
+            </a:r>
+            <a:endParaRPr lang="pl-PL" sz="1200" dirty="0" smtClean="0"/>
+          </a:p>
+          <a:p>
+            <a:pPr marL="0" indent="0">
+              <a:buNone/>
+            </a:pPr>
+            <a:r>
+              <a:rPr lang="en-US" sz="1200" dirty="0">
+                <a:hlinkClick r:id="rId3"/>
+              </a:rPr>
+              <a:t>https://</a:t>
+            </a:r>
+            <a:r>
+              <a:rPr lang="en-US" sz="1200" dirty="0" smtClean="0">
+                <a:hlinkClick r:id="rId3"/>
+              </a:rPr>
+              <a:t>www.guru99.com/software-engineering-tutorial.html</a:t>
+            </a:r>
+            <a:endParaRPr lang="pl-PL" sz="1200" smtClean="0"/>
+          </a:p>
+          <a:p>
+            <a:pPr marL="0" indent="0">
+              <a:buNone/>
+            </a:pPr>
+            <a:endParaRPr lang="en-US" sz="1200" dirty="0"/>
+          </a:p>
+        </p:txBody>
+      </p:sp>
+    </p:spTree>
+    <p:extLst>
+      <p:ext uri="{BB962C8B-B14F-4D97-AF65-F5344CB8AC3E}">
+        <p14:creationId xmlns:p14="http://schemas.microsoft.com/office/powerpoint/2010/main" val="1449403051"/>
+      </p:ext>
+    </p:extLst>
+  </p:cSld>
+  <p:clrMapOvr>
+    <a:masterClrMapping/>
+  </p:clrMapOvr>
+</p:sld>
+</file>
+
+<file path=ppt/slides/slide31.xml><?xml version="1.0" encoding="utf-8"?>
+<p:sld xmlns:a="http://schemas.openxmlformats.org/drawingml/2006/main" xmlns:r="http://schemas.openxmlformats.org/officeDocument/2006/relationships" xmlns:p="http://schemas.openxmlformats.org/presentationml/2006/main">
+  <p:cSld>
+    <p:bg>
+      <p:bgPr>
+        <a:blipFill dpi="0" rotWithShape="1">
+          <a:blip r:embed="rId2">
+            <a:lum/>
+          </a:blip>
+          <a:srcRect/>
+          <a:stretch>
+            <a:fillRect/>
+          </a:stretch>
+        </a:blipFill>
+        <a:effectLst/>
+      </p:bgPr>
+    </p:bg>
+    <p:spTree>
+      <p:nvGrpSpPr>
+        <p:cNvPr id="1" name=""/>
+        <p:cNvGrpSpPr/>
+        <p:nvPr/>
+      </p:nvGrpSpPr>
+      <p:grpSpPr>
+        <a:xfrm>
+          <a:off x="0" y="0"/>
+          <a:ext cx="0" cy="0"/>
+          <a:chOff x="0" y="0"/>
+          <a:chExt cx="0" cy="0"/>
+        </a:xfrm>
+      </p:grpSpPr>
+      <p:sp>
+        <p:nvSpPr>
+          <p:cNvPr id="4" name="pole tekstowe 3"/>
+          <p:cNvSpPr txBox="1"/>
+          <p:nvPr/>
+        </p:nvSpPr>
+        <p:spPr>
+          <a:xfrm>
+            <a:off x="467544" y="4011910"/>
+            <a:ext cx="2592288" cy="784830"/>
+          </a:xfrm>
+          <a:prstGeom prst="rect">
+            <a:avLst/>
+          </a:prstGeom>
+          <a:noFill/>
+        </p:spPr>
+        <p:txBody>
+          <a:bodyPr wrap="square" rtlCol="0">
+            <a:spAutoFit/>
+          </a:bodyPr>
+          <a:lstStyle/>
+          <a:p>
+            <a:endParaRPr lang="pl-PL" sz="900" dirty="0" smtClean="0">
+              <a:latin typeface="Verdana" panose="020B0604030504040204" pitchFamily="34" charset="0"/>
+              <a:ea typeface="Verdana" panose="020B0604030504040204" pitchFamily="34" charset="0"/>
+            </a:endParaRPr>
+          </a:p>
+          <a:p>
+            <a:endParaRPr lang="pl-PL" sz="900" dirty="0">
+              <a:latin typeface="Verdana" panose="020B0604030504040204" pitchFamily="34" charset="0"/>
+              <a:ea typeface="Verdana" panose="020B0604030504040204" pitchFamily="34" charset="0"/>
+            </a:endParaRPr>
+          </a:p>
+          <a:p>
+            <a:r>
+              <a:rPr lang="pl-PL" sz="900" dirty="0" smtClean="0">
+                <a:latin typeface="Verdana" panose="020B0604030504040204" pitchFamily="34" charset="0"/>
+                <a:ea typeface="Verdana" panose="020B0604030504040204" pitchFamily="34" charset="0"/>
+              </a:rPr>
+              <a:t>ZAKŁADY MECHANICZNE „TARNÓW” S.A.</a:t>
+            </a:r>
+          </a:p>
+          <a:p>
+            <a:r>
+              <a:rPr lang="pl-PL" sz="900" dirty="0" smtClean="0">
+                <a:latin typeface="Verdana" panose="020B0604030504040204" pitchFamily="34" charset="0"/>
+                <a:ea typeface="Verdana" panose="020B0604030504040204" pitchFamily="34" charset="0"/>
+              </a:rPr>
+              <a:t>UL. KOCHANOWSKIEGO 30</a:t>
+            </a:r>
+          </a:p>
+          <a:p>
+            <a:r>
+              <a:rPr lang="pl-PL" sz="900" dirty="0" smtClean="0">
+                <a:latin typeface="Verdana" panose="020B0604030504040204" pitchFamily="34" charset="0"/>
+                <a:ea typeface="Verdana" panose="020B0604030504040204" pitchFamily="34" charset="0"/>
+              </a:rPr>
+              <a:t>33-100 TARNÓW</a:t>
+            </a:r>
+            <a:endParaRPr lang="en-US" sz="900" dirty="0">
+              <a:latin typeface="Verdana" panose="020B0604030504040204" pitchFamily="34" charset="0"/>
+              <a:ea typeface="Verdana" panose="020B0604030504040204" pitchFamily="34" charset="0"/>
+            </a:endParaRPr>
+          </a:p>
+        </p:txBody>
+      </p:sp>
+      <p:sp>
+        <p:nvSpPr>
+          <p:cNvPr id="5" name="pole tekstowe 4"/>
+          <p:cNvSpPr txBox="1"/>
+          <p:nvPr/>
+        </p:nvSpPr>
+        <p:spPr>
+          <a:xfrm>
+            <a:off x="3059832" y="4011910"/>
+            <a:ext cx="2592288" cy="923330"/>
+          </a:xfrm>
+          <a:prstGeom prst="rect">
+            <a:avLst/>
+          </a:prstGeom>
+          <a:noFill/>
+        </p:spPr>
+        <p:txBody>
+          <a:bodyPr wrap="square" rtlCol="0">
+            <a:spAutoFit/>
+          </a:bodyPr>
+          <a:lstStyle/>
+          <a:p>
+            <a:endParaRPr lang="pl-PL" sz="900" dirty="0" smtClean="0">
+              <a:latin typeface="Verdana" panose="020B0604030504040204" pitchFamily="34" charset="0"/>
+              <a:ea typeface="Verdana" panose="020B0604030504040204" pitchFamily="34" charset="0"/>
+            </a:endParaRPr>
+          </a:p>
+          <a:p>
+            <a:endParaRPr lang="pl-PL" sz="900" dirty="0">
+              <a:latin typeface="Verdana" panose="020B0604030504040204" pitchFamily="34" charset="0"/>
+              <a:ea typeface="Verdana" panose="020B0604030504040204" pitchFamily="34" charset="0"/>
+            </a:endParaRPr>
+          </a:p>
+          <a:p>
+            <a:r>
+              <a:rPr lang="pl-PL" sz="900" dirty="0" smtClean="0">
+                <a:latin typeface="Verdana" panose="020B0604030504040204" pitchFamily="34" charset="0"/>
+                <a:ea typeface="Verdana" panose="020B0604030504040204" pitchFamily="34" charset="0"/>
+              </a:rPr>
+              <a:t>TEL. (+48) 14 630 62 00</a:t>
+            </a:r>
+          </a:p>
+          <a:p>
+            <a:r>
+              <a:rPr lang="pl-PL" sz="900" dirty="0" smtClean="0">
+                <a:latin typeface="Verdana" panose="020B0604030504040204" pitchFamily="34" charset="0"/>
+                <a:ea typeface="Verdana" panose="020B0604030504040204" pitchFamily="34" charset="0"/>
+              </a:rPr>
+              <a:t>FAKS (+48) 14 630 62 04</a:t>
+            </a:r>
+          </a:p>
+          <a:p>
+            <a:r>
+              <a:rPr lang="pl-PL" sz="900" dirty="0" smtClean="0">
+                <a:latin typeface="Verdana" panose="020B0604030504040204" pitchFamily="34" charset="0"/>
+                <a:ea typeface="Verdana" panose="020B0604030504040204" pitchFamily="34" charset="0"/>
+              </a:rPr>
+              <a:t>ZMT@ZMT.TARNOW.PL</a:t>
+            </a:r>
+          </a:p>
+          <a:p>
+            <a:r>
+              <a:rPr lang="pl-PL" sz="900" dirty="0" smtClean="0">
+                <a:latin typeface="Verdana" panose="020B0604030504040204" pitchFamily="34" charset="0"/>
+                <a:ea typeface="Verdana" panose="020B0604030504040204" pitchFamily="34" charset="0"/>
+              </a:rPr>
+              <a:t>WWW.ZMT.TARNOW.PL</a:t>
+            </a:r>
+            <a:endParaRPr lang="en-US" sz="900" dirty="0">
+              <a:latin typeface="Verdana" panose="020B0604030504040204" pitchFamily="34" charset="0"/>
+              <a:ea typeface="Verdana" panose="020B0604030504040204" pitchFamily="34" charset="0"/>
+            </a:endParaRPr>
+          </a:p>
+        </p:txBody>
+      </p:sp>
+      <p:sp>
+        <p:nvSpPr>
+          <p:cNvPr id="6" name="pole tekstowe 5"/>
+          <p:cNvSpPr txBox="1"/>
+          <p:nvPr/>
+        </p:nvSpPr>
+        <p:spPr>
+          <a:xfrm>
+            <a:off x="467544" y="3507854"/>
+            <a:ext cx="2376264" cy="369332"/>
+          </a:xfrm>
+          <a:prstGeom prst="rect">
+            <a:avLst/>
+          </a:prstGeom>
+          <a:noFill/>
+        </p:spPr>
+        <p:txBody>
+          <a:bodyPr wrap="square" rtlCol="0">
+            <a:spAutoFit/>
+          </a:bodyPr>
+          <a:lstStyle/>
+          <a:p>
+            <a:r>
+              <a:rPr lang="pl-PL" dirty="0" smtClean="0">
+                <a:latin typeface="Verdana" panose="020B0604030504040204" pitchFamily="34" charset="0"/>
+                <a:ea typeface="Verdana" panose="020B0604030504040204" pitchFamily="34" charset="0"/>
+              </a:rPr>
+              <a:t>TARNÓW 2020</a:t>
+            </a:r>
+            <a:endParaRPr lang="en-US" dirty="0">
+              <a:latin typeface="Verdana" panose="020B0604030504040204" pitchFamily="34" charset="0"/>
+              <a:ea typeface="Verdana" panose="020B0604030504040204" pitchFamily="34" charset="0"/>
+            </a:endParaRPr>
+          </a:p>
+        </p:txBody>
+      </p:sp>
+      <p:sp>
+        <p:nvSpPr>
+          <p:cNvPr id="7" name="pole tekstowe 6"/>
+          <p:cNvSpPr txBox="1"/>
+          <p:nvPr/>
+        </p:nvSpPr>
+        <p:spPr>
+          <a:xfrm>
+            <a:off x="467544" y="2412404"/>
+            <a:ext cx="2952328" cy="584775"/>
+          </a:xfrm>
+          <a:prstGeom prst="rect">
+            <a:avLst/>
+          </a:prstGeom>
+          <a:noFill/>
+        </p:spPr>
+        <p:txBody>
+          <a:bodyPr wrap="square" rtlCol="0">
+            <a:spAutoFit/>
+          </a:bodyPr>
+          <a:lstStyle/>
+          <a:p>
+            <a:r>
+              <a:rPr lang="pl-PL" sz="3200" dirty="0" smtClean="0">
+                <a:latin typeface="Verdana" panose="020B0604030504040204" pitchFamily="34" charset="0"/>
+                <a:ea typeface="Verdana" panose="020B0604030504040204" pitchFamily="34" charset="0"/>
+              </a:rPr>
+              <a:t>DZIĘKUJEMY</a:t>
+            </a:r>
+            <a:endParaRPr lang="en-US" sz="3200" dirty="0">
+              <a:latin typeface="Verdana" panose="020B0604030504040204" pitchFamily="34" charset="0"/>
+              <a:ea typeface="Verdana" panose="020B0604030504040204" pitchFamily="34" charset="0"/>
+            </a:endParaRPr>
+          </a:p>
+        </p:txBody>
+      </p:sp>
+    </p:spTree>
+    <p:extLst>
+      <p:ext uri="{BB962C8B-B14F-4D97-AF65-F5344CB8AC3E}">
+        <p14:creationId xmlns:p14="http://schemas.microsoft.com/office/powerpoint/2010/main" val="397827909"/>
       </p:ext>
     </p:extLst>
   </p:cSld>
@@ -6736,46 +8531,87 @@
       </p:grpSpPr>
       <p:sp>
         <p:nvSpPr>
-          <p:cNvPr id="2" name="Tytuł 1"/>
-          <p:cNvSpPr>
-            <a:spLocks noGrp="1"/>
-          </p:cNvSpPr>
-          <p:nvPr>
-            <p:ph type="title"/>
+          <p:cNvPr id="3" name="Symbol zastępczy zawartości 2"/>
+          <p:cNvSpPr>
+            <a:spLocks noGrp="1"/>
+          </p:cNvSpPr>
+          <p:nvPr>
+            <p:ph idx="1"/>
           </p:nvPr>
         </p:nvSpPr>
         <p:spPr/>
         <p:txBody>
-          <a:bodyPr/>
+          <a:bodyPr>
+            <a:normAutofit/>
+          </a:bodyPr>
           <a:lstStyle/>
           <a:p>
-            <a:endParaRPr lang="pl-PL"/>
-          </a:p>
-        </p:txBody>
-      </p:sp>
-      <p:sp>
-        <p:nvSpPr>
-          <p:cNvPr id="3" name="Symbol zastępczy zawartości 2"/>
-          <p:cNvSpPr>
-            <a:spLocks noGrp="1"/>
-          </p:cNvSpPr>
-          <p:nvPr>
-            <p:ph idx="1"/>
-          </p:nvPr>
-        </p:nvSpPr>
-        <p:spPr/>
-        <p:txBody>
-          <a:bodyPr/>
-          <a:lstStyle/>
-          <a:p>
-            <a:endParaRPr lang="pl-PL"/>
-          </a:p>
-        </p:txBody>
-      </p:sp>
+            <a:pPr marL="0" indent="0">
+              <a:buNone/>
+            </a:pPr>
+            <a:r>
+              <a:rPr lang="pl-PL" sz="1800" b="1" dirty="0" smtClean="0"/>
+              <a:t>Metodyki wytwarzania oprogramowania</a:t>
+            </a:r>
+          </a:p>
+        </p:txBody>
+      </p:sp>
+      <p:pic>
+        <p:nvPicPr>
+          <p:cNvPr id="1034" name="Picture 10"/>
+          <p:cNvPicPr>
+            <a:picLocks noChangeAspect="1" noChangeArrowheads="1"/>
+          </p:cNvPicPr>
+          <p:nvPr/>
+        </p:nvPicPr>
+        <p:blipFill rotWithShape="1">
+          <a:blip r:embed="rId2" cstate="print">
+            <a:extLst>
+              <a:ext uri="{28A0092B-C50C-407E-A947-70E740481C1C}">
+                <a14:useLocalDpi xmlns:a14="http://schemas.microsoft.com/office/drawing/2010/main" val="0"/>
+              </a:ext>
+            </a:extLst>
+          </a:blip>
+          <a:srcRect b="9385"/>
+          <a:stretch/>
+        </p:blipFill>
+        <p:spPr bwMode="auto">
+          <a:xfrm>
+            <a:off x="683568" y="1635646"/>
+            <a:ext cx="4618043" cy="2494920"/>
+          </a:xfrm>
+          <a:prstGeom prst="rect">
+            <a:avLst/>
+          </a:prstGeom>
+          <a:noFill/>
+          <a:ln>
+            <a:noFill/>
+          </a:ln>
+          <a:extLst>
+            <a:ext uri="{909E8E84-426E-40DD-AFC4-6F175D3DCCD1}">
+              <a14:hiddenFill xmlns:a14="http://schemas.microsoft.com/office/drawing/2010/main">
+                <a:solidFill>
+                  <a:schemeClr val="accent1"/>
+                </a:solidFill>
+              </a14:hiddenFill>
+            </a:ext>
+            <a:ext uri="{91240B29-F687-4F45-9708-019B960494DF}">
+              <a14:hiddenLine xmlns:a14="http://schemas.microsoft.com/office/drawing/2010/main" w="9525">
+                <a:solidFill>
+                  <a:schemeClr val="tx1"/>
+                </a:solidFill>
+                <a:miter lim="800000"/>
+                <a:headEnd/>
+                <a:tailEnd/>
+              </a14:hiddenLine>
+            </a:ext>
+          </a:extLst>
+        </p:spPr>
+      </p:pic>
     </p:spTree>
     <p:extLst>
       <p:ext uri="{BB962C8B-B14F-4D97-AF65-F5344CB8AC3E}">
-        <p14:creationId xmlns:p14="http://schemas.microsoft.com/office/powerpoint/2010/main" val="3217496695"/>
+        <p14:creationId xmlns:p14="http://schemas.microsoft.com/office/powerpoint/2010/main" val="3431002324"/>
       </p:ext>
     </p:extLst>
   </p:cSld>

</xml_diff>